<commit_message>
added draft of new MVC slides
</commit_message>
<xml_diff>
--- a/7 - Design Patterns/Model-View-Controller Architecture.pptx
+++ b/7 - Design Patterns/Model-View-Controller Architecture.pptx
@@ -5,19 +5,16 @@
     <p:sldMasterId id="2147483648" r:id="rId1"/>
   </p:sldMasterIdLst>
   <p:notesMasterIdLst>
-    <p:notesMasterId r:id="rId12"/>
+    <p:notesMasterId r:id="rId9"/>
   </p:notesMasterIdLst>
   <p:sldIdLst>
     <p:sldId id="336" r:id="rId2"/>
     <p:sldId id="364" r:id="rId3"/>
     <p:sldId id="371" r:id="rId4"/>
     <p:sldId id="379" r:id="rId5"/>
-    <p:sldId id="375" r:id="rId6"/>
-    <p:sldId id="378" r:id="rId7"/>
-    <p:sldId id="376" r:id="rId8"/>
-    <p:sldId id="381" r:id="rId9"/>
-    <p:sldId id="377" r:id="rId10"/>
-    <p:sldId id="380" r:id="rId11"/>
+    <p:sldId id="378" r:id="rId6"/>
+    <p:sldId id="381" r:id="rId7"/>
+    <p:sldId id="380" r:id="rId8"/>
   </p:sldIdLst>
   <p:sldSz cx="12192000" cy="6858000"/>
   <p:notesSz cx="6858000" cy="9144000"/>
@@ -214,7 +211,7 @@
           <a:p>
             <a:fld id="{F666E1FD-E7A0-497B-BBC0-740BAAC97C64}" type="datetimeFigureOut">
               <a:rPr lang="en-PH" smtClean="0"/>
-              <a:t>22/05/2023</a:t>
+              <a:t>05/05/2025</a:t>
             </a:fld>
             <a:endParaRPr lang="en-PH"/>
           </a:p>
@@ -566,90 +563,6 @@
 </p:notes>
 </file>
 
-<file path=ppt/notesSlides/notesSlide10.xml><?xml version="1.0" encoding="utf-8"?>
-<p:notes xmlns:a="http://schemas.openxmlformats.org/drawingml/2006/main" xmlns:r="http://schemas.openxmlformats.org/officeDocument/2006/relationships" xmlns:p="http://schemas.openxmlformats.org/presentationml/2006/main">
-  <p:cSld>
-    <p:spTree>
-      <p:nvGrpSpPr>
-        <p:cNvPr id="1" name=""/>
-        <p:cNvGrpSpPr/>
-        <p:nvPr/>
-      </p:nvGrpSpPr>
-      <p:grpSpPr>
-        <a:xfrm>
-          <a:off x="0" y="0"/>
-          <a:ext cx="0" cy="0"/>
-          <a:chOff x="0" y="0"/>
-          <a:chExt cx="0" cy="0"/>
-        </a:xfrm>
-      </p:grpSpPr>
-      <p:sp>
-        <p:nvSpPr>
-          <p:cNvPr id="2" name="Slide Image Placeholder 1"/>
-          <p:cNvSpPr>
-            <a:spLocks noGrp="1" noRot="1" noChangeAspect="1"/>
-          </p:cNvSpPr>
-          <p:nvPr>
-            <p:ph type="sldImg"/>
-          </p:nvPr>
-        </p:nvSpPr>
-        <p:spPr/>
-      </p:sp>
-      <p:sp>
-        <p:nvSpPr>
-          <p:cNvPr id="3" name="Notes Placeholder 2"/>
-          <p:cNvSpPr>
-            <a:spLocks noGrp="1"/>
-          </p:cNvSpPr>
-          <p:nvPr>
-            <p:ph type="body" idx="1"/>
-          </p:nvPr>
-        </p:nvSpPr>
-        <p:spPr/>
-        <p:txBody>
-          <a:bodyPr/>
-          <a:lstStyle/>
-          <a:p>
-            <a:endParaRPr lang="en-PH" dirty="0"/>
-          </a:p>
-        </p:txBody>
-      </p:sp>
-      <p:sp>
-        <p:nvSpPr>
-          <p:cNvPr id="4" name="Slide Number Placeholder 3"/>
-          <p:cNvSpPr>
-            <a:spLocks noGrp="1"/>
-          </p:cNvSpPr>
-          <p:nvPr>
-            <p:ph type="sldNum" sz="quarter" idx="5"/>
-          </p:nvPr>
-        </p:nvSpPr>
-        <p:spPr/>
-        <p:txBody>
-          <a:bodyPr/>
-          <a:lstStyle/>
-          <a:p>
-            <a:fld id="{FE90CCE9-4AAE-4E1F-85AD-521A406D6524}" type="slidenum">
-              <a:rPr lang="en-PH" smtClean="0"/>
-              <a:t>10</a:t>
-            </a:fld>
-            <a:endParaRPr lang="en-PH"/>
-          </a:p>
-        </p:txBody>
-      </p:sp>
-    </p:spTree>
-    <p:extLst>
-      <p:ext uri="{BB962C8B-B14F-4D97-AF65-F5344CB8AC3E}">
-        <p14:creationId xmlns:p14="http://schemas.microsoft.com/office/powerpoint/2010/main" val="2297602543"/>
-      </p:ext>
-    </p:extLst>
-  </p:cSld>
-  <p:clrMapOvr>
-    <a:masterClrMapping/>
-  </p:clrMapOvr>
-</p:notes>
-</file>
-
 <file path=ppt/notesSlides/notesSlide2.xml><?xml version="1.0" encoding="utf-8"?>
 <p:notes xmlns:a="http://schemas.openxmlformats.org/drawingml/2006/main" xmlns:r="http://schemas.openxmlformats.org/officeDocument/2006/relationships" xmlns:p="http://schemas.openxmlformats.org/presentationml/2006/main">
   <p:cSld>
@@ -976,7 +889,7 @@
     </p:spTree>
     <p:extLst>
       <p:ext uri="{BB962C8B-B14F-4D97-AF65-F5344CB8AC3E}">
-        <p14:creationId xmlns:p14="http://schemas.microsoft.com/office/powerpoint/2010/main" val="3334850775"/>
+        <p14:creationId xmlns:p14="http://schemas.microsoft.com/office/powerpoint/2010/main" val="1437902413"/>
       </p:ext>
     </p:extLst>
   </p:cSld>
@@ -1060,7 +973,7 @@
     </p:spTree>
     <p:extLst>
       <p:ext uri="{BB962C8B-B14F-4D97-AF65-F5344CB8AC3E}">
-        <p14:creationId xmlns:p14="http://schemas.microsoft.com/office/powerpoint/2010/main" val="1437902413"/>
+        <p14:creationId xmlns:p14="http://schemas.microsoft.com/office/powerpoint/2010/main" val="3574310541"/>
       </p:ext>
     </p:extLst>
   </p:cSld>
@@ -1144,175 +1057,7 @@
     </p:spTree>
     <p:extLst>
       <p:ext uri="{BB962C8B-B14F-4D97-AF65-F5344CB8AC3E}">
-        <p14:creationId xmlns:p14="http://schemas.microsoft.com/office/powerpoint/2010/main" val="3046600662"/>
-      </p:ext>
-    </p:extLst>
-  </p:cSld>
-  <p:clrMapOvr>
-    <a:masterClrMapping/>
-  </p:clrMapOvr>
-</p:notes>
-</file>
-
-<file path=ppt/notesSlides/notesSlide8.xml><?xml version="1.0" encoding="utf-8"?>
-<p:notes xmlns:a="http://schemas.openxmlformats.org/drawingml/2006/main" xmlns:r="http://schemas.openxmlformats.org/officeDocument/2006/relationships" xmlns:p="http://schemas.openxmlformats.org/presentationml/2006/main">
-  <p:cSld>
-    <p:spTree>
-      <p:nvGrpSpPr>
-        <p:cNvPr id="1" name=""/>
-        <p:cNvGrpSpPr/>
-        <p:nvPr/>
-      </p:nvGrpSpPr>
-      <p:grpSpPr>
-        <a:xfrm>
-          <a:off x="0" y="0"/>
-          <a:ext cx="0" cy="0"/>
-          <a:chOff x="0" y="0"/>
-          <a:chExt cx="0" cy="0"/>
-        </a:xfrm>
-      </p:grpSpPr>
-      <p:sp>
-        <p:nvSpPr>
-          <p:cNvPr id="2" name="Slide Image Placeholder 1"/>
-          <p:cNvSpPr>
-            <a:spLocks noGrp="1" noRot="1" noChangeAspect="1"/>
-          </p:cNvSpPr>
-          <p:nvPr>
-            <p:ph type="sldImg"/>
-          </p:nvPr>
-        </p:nvSpPr>
-        <p:spPr/>
-      </p:sp>
-      <p:sp>
-        <p:nvSpPr>
-          <p:cNvPr id="3" name="Notes Placeholder 2"/>
-          <p:cNvSpPr>
-            <a:spLocks noGrp="1"/>
-          </p:cNvSpPr>
-          <p:nvPr>
-            <p:ph type="body" idx="1"/>
-          </p:nvPr>
-        </p:nvSpPr>
-        <p:spPr/>
-        <p:txBody>
-          <a:bodyPr/>
-          <a:lstStyle/>
-          <a:p>
-            <a:endParaRPr lang="en-PH" dirty="0"/>
-          </a:p>
-        </p:txBody>
-      </p:sp>
-      <p:sp>
-        <p:nvSpPr>
-          <p:cNvPr id="4" name="Slide Number Placeholder 3"/>
-          <p:cNvSpPr>
-            <a:spLocks noGrp="1"/>
-          </p:cNvSpPr>
-          <p:nvPr>
-            <p:ph type="sldNum" sz="quarter" idx="5"/>
-          </p:nvPr>
-        </p:nvSpPr>
-        <p:spPr/>
-        <p:txBody>
-          <a:bodyPr/>
-          <a:lstStyle/>
-          <a:p>
-            <a:fld id="{FE90CCE9-4AAE-4E1F-85AD-521A406D6524}" type="slidenum">
-              <a:rPr lang="en-PH" smtClean="0"/>
-              <a:t>8</a:t>
-            </a:fld>
-            <a:endParaRPr lang="en-PH"/>
-          </a:p>
-        </p:txBody>
-      </p:sp>
-    </p:spTree>
-    <p:extLst>
-      <p:ext uri="{BB962C8B-B14F-4D97-AF65-F5344CB8AC3E}">
-        <p14:creationId xmlns:p14="http://schemas.microsoft.com/office/powerpoint/2010/main" val="3574310541"/>
-      </p:ext>
-    </p:extLst>
-  </p:cSld>
-  <p:clrMapOvr>
-    <a:masterClrMapping/>
-  </p:clrMapOvr>
-</p:notes>
-</file>
-
-<file path=ppt/notesSlides/notesSlide9.xml><?xml version="1.0" encoding="utf-8"?>
-<p:notes xmlns:a="http://schemas.openxmlformats.org/drawingml/2006/main" xmlns:r="http://schemas.openxmlformats.org/officeDocument/2006/relationships" xmlns:p="http://schemas.openxmlformats.org/presentationml/2006/main">
-  <p:cSld>
-    <p:spTree>
-      <p:nvGrpSpPr>
-        <p:cNvPr id="1" name=""/>
-        <p:cNvGrpSpPr/>
-        <p:nvPr/>
-      </p:nvGrpSpPr>
-      <p:grpSpPr>
-        <a:xfrm>
-          <a:off x="0" y="0"/>
-          <a:ext cx="0" cy="0"/>
-          <a:chOff x="0" y="0"/>
-          <a:chExt cx="0" cy="0"/>
-        </a:xfrm>
-      </p:grpSpPr>
-      <p:sp>
-        <p:nvSpPr>
-          <p:cNvPr id="2" name="Slide Image Placeholder 1"/>
-          <p:cNvSpPr>
-            <a:spLocks noGrp="1" noRot="1" noChangeAspect="1"/>
-          </p:cNvSpPr>
-          <p:nvPr>
-            <p:ph type="sldImg"/>
-          </p:nvPr>
-        </p:nvSpPr>
-        <p:spPr/>
-      </p:sp>
-      <p:sp>
-        <p:nvSpPr>
-          <p:cNvPr id="3" name="Notes Placeholder 2"/>
-          <p:cNvSpPr>
-            <a:spLocks noGrp="1"/>
-          </p:cNvSpPr>
-          <p:nvPr>
-            <p:ph type="body" idx="1"/>
-          </p:nvPr>
-        </p:nvSpPr>
-        <p:spPr/>
-        <p:txBody>
-          <a:bodyPr/>
-          <a:lstStyle/>
-          <a:p>
-            <a:endParaRPr lang="en-PH" dirty="0"/>
-          </a:p>
-        </p:txBody>
-      </p:sp>
-      <p:sp>
-        <p:nvSpPr>
-          <p:cNvPr id="4" name="Slide Number Placeholder 3"/>
-          <p:cNvSpPr>
-            <a:spLocks noGrp="1"/>
-          </p:cNvSpPr>
-          <p:nvPr>
-            <p:ph type="sldNum" sz="quarter" idx="5"/>
-          </p:nvPr>
-        </p:nvSpPr>
-        <p:spPr/>
-        <p:txBody>
-          <a:bodyPr/>
-          <a:lstStyle/>
-          <a:p>
-            <a:fld id="{FE90CCE9-4AAE-4E1F-85AD-521A406D6524}" type="slidenum">
-              <a:rPr lang="en-PH" smtClean="0"/>
-              <a:t>9</a:t>
-            </a:fld>
-            <a:endParaRPr lang="en-PH"/>
-          </a:p>
-        </p:txBody>
-      </p:sp>
-    </p:spTree>
-    <p:extLst>
-      <p:ext uri="{BB962C8B-B14F-4D97-AF65-F5344CB8AC3E}">
-        <p14:creationId xmlns:p14="http://schemas.microsoft.com/office/powerpoint/2010/main" val="1579191421"/>
+        <p14:creationId xmlns:p14="http://schemas.microsoft.com/office/powerpoint/2010/main" val="2297602543"/>
       </p:ext>
     </p:extLst>
   </p:cSld>
@@ -1471,7 +1216,7 @@
           <a:p>
             <a:fld id="{0CCF0B81-6BD8-4C65-9459-815598C5F1F4}" type="datetimeFigureOut">
               <a:rPr lang="en-PH" smtClean="0"/>
-              <a:t>22/05/2023</a:t>
+              <a:t>05/05/2025</a:t>
             </a:fld>
             <a:endParaRPr lang="en-PH"/>
           </a:p>
@@ -1671,7 +1416,7 @@
           <a:p>
             <a:fld id="{0CCF0B81-6BD8-4C65-9459-815598C5F1F4}" type="datetimeFigureOut">
               <a:rPr lang="en-PH" smtClean="0"/>
-              <a:t>22/05/2023</a:t>
+              <a:t>05/05/2025</a:t>
             </a:fld>
             <a:endParaRPr lang="en-PH"/>
           </a:p>
@@ -1881,7 +1626,7 @@
           <a:p>
             <a:fld id="{0CCF0B81-6BD8-4C65-9459-815598C5F1F4}" type="datetimeFigureOut">
               <a:rPr lang="en-PH" smtClean="0"/>
-              <a:t>22/05/2023</a:t>
+              <a:t>05/05/2025</a:t>
             </a:fld>
             <a:endParaRPr lang="en-PH"/>
           </a:p>
@@ -2081,7 +1826,7 @@
           <a:p>
             <a:fld id="{0CCF0B81-6BD8-4C65-9459-815598C5F1F4}" type="datetimeFigureOut">
               <a:rPr lang="en-PH" smtClean="0"/>
-              <a:t>22/05/2023</a:t>
+              <a:t>05/05/2025</a:t>
             </a:fld>
             <a:endParaRPr lang="en-PH"/>
           </a:p>
@@ -2357,7 +2102,7 @@
           <a:p>
             <a:fld id="{0CCF0B81-6BD8-4C65-9459-815598C5F1F4}" type="datetimeFigureOut">
               <a:rPr lang="en-PH" smtClean="0"/>
-              <a:t>22/05/2023</a:t>
+              <a:t>05/05/2025</a:t>
             </a:fld>
             <a:endParaRPr lang="en-PH"/>
           </a:p>
@@ -2625,7 +2370,7 @@
           <a:p>
             <a:fld id="{0CCF0B81-6BD8-4C65-9459-815598C5F1F4}" type="datetimeFigureOut">
               <a:rPr lang="en-PH" smtClean="0"/>
-              <a:t>22/05/2023</a:t>
+              <a:t>05/05/2025</a:t>
             </a:fld>
             <a:endParaRPr lang="en-PH"/>
           </a:p>
@@ -3040,7 +2785,7 @@
           <a:p>
             <a:fld id="{0CCF0B81-6BD8-4C65-9459-815598C5F1F4}" type="datetimeFigureOut">
               <a:rPr lang="en-PH" smtClean="0"/>
-              <a:t>22/05/2023</a:t>
+              <a:t>05/05/2025</a:t>
             </a:fld>
             <a:endParaRPr lang="en-PH"/>
           </a:p>
@@ -3182,7 +2927,7 @@
           <a:p>
             <a:fld id="{0CCF0B81-6BD8-4C65-9459-815598C5F1F4}" type="datetimeFigureOut">
               <a:rPr lang="en-PH" smtClean="0"/>
-              <a:t>22/05/2023</a:t>
+              <a:t>05/05/2025</a:t>
             </a:fld>
             <a:endParaRPr lang="en-PH"/>
           </a:p>
@@ -3295,7 +3040,7 @@
           <a:p>
             <a:fld id="{0CCF0B81-6BD8-4C65-9459-815598C5F1F4}" type="datetimeFigureOut">
               <a:rPr lang="en-PH" smtClean="0"/>
-              <a:t>22/05/2023</a:t>
+              <a:t>05/05/2025</a:t>
             </a:fld>
             <a:endParaRPr lang="en-PH"/>
           </a:p>
@@ -3608,7 +3353,7 @@
           <a:p>
             <a:fld id="{0CCF0B81-6BD8-4C65-9459-815598C5F1F4}" type="datetimeFigureOut">
               <a:rPr lang="en-PH" smtClean="0"/>
-              <a:t>22/05/2023</a:t>
+              <a:t>05/05/2025</a:t>
             </a:fld>
             <a:endParaRPr lang="en-PH"/>
           </a:p>
@@ -3897,7 +3642,7 @@
           <a:p>
             <a:fld id="{0CCF0B81-6BD8-4C65-9459-815598C5F1F4}" type="datetimeFigureOut">
               <a:rPr lang="en-PH" smtClean="0"/>
-              <a:t>22/05/2023</a:t>
+              <a:t>05/05/2025</a:t>
             </a:fld>
             <a:endParaRPr lang="en-PH"/>
           </a:p>
@@ -4140,7 +3885,7 @@
           <a:p>
             <a:fld id="{0CCF0B81-6BD8-4C65-9459-815598C5F1F4}" type="datetimeFigureOut">
               <a:rPr lang="en-PH" smtClean="0"/>
-              <a:t>22/05/2023</a:t>
+              <a:t>05/05/2025</a:t>
             </a:fld>
             <a:endParaRPr lang="en-PH"/>
           </a:p>
@@ -4720,413 +4465,6 @@
 </p:sld>
 </file>
 
-<file path=ppt/slides/slide10.xml><?xml version="1.0" encoding="utf-8"?>
-<p:sld xmlns:a="http://schemas.openxmlformats.org/drawingml/2006/main" xmlns:r="http://schemas.openxmlformats.org/officeDocument/2006/relationships" xmlns:p="http://schemas.openxmlformats.org/presentationml/2006/main">
-  <p:cSld>
-    <p:bg>
-      <p:bgPr>
-        <a:blipFill dpi="0" rotWithShape="1">
-          <a:blip r:embed="rId3">
-            <a:alphaModFix amt="99000"/>
-            <a:lum/>
-          </a:blip>
-          <a:srcRect/>
-          <a:stretch>
-            <a:fillRect t="89000" r="85000" b="-1000"/>
-          </a:stretch>
-        </a:blipFill>
-        <a:effectLst/>
-      </p:bgPr>
-    </p:bg>
-    <p:spTree>
-      <p:nvGrpSpPr>
-        <p:cNvPr id="1" name=""/>
-        <p:cNvGrpSpPr/>
-        <p:nvPr/>
-      </p:nvGrpSpPr>
-      <p:grpSpPr>
-        <a:xfrm>
-          <a:off x="0" y="0"/>
-          <a:ext cx="0" cy="0"/>
-          <a:chOff x="0" y="0"/>
-          <a:chExt cx="0" cy="0"/>
-        </a:xfrm>
-      </p:grpSpPr>
-      <p:sp>
-        <p:nvSpPr>
-          <p:cNvPr id="2" name="Title 1">
-            <a:extLst>
-              <a:ext uri="{FF2B5EF4-FFF2-40B4-BE49-F238E27FC236}">
-                <a16:creationId xmlns:a16="http://schemas.microsoft.com/office/drawing/2014/main" id="{6A3DCE86-C2BA-4713-9E7A-73589E8D6CCF}"/>
-              </a:ext>
-            </a:extLst>
-          </p:cNvPr>
-          <p:cNvSpPr>
-            <a:spLocks noGrp="1"/>
-          </p:cNvSpPr>
-          <p:nvPr>
-            <p:ph type="ctrTitle"/>
-          </p:nvPr>
-        </p:nvSpPr>
-        <p:spPr>
-          <a:xfrm>
-            <a:off x="1524000" y="497150"/>
-            <a:ext cx="9144000" cy="718459"/>
-          </a:xfrm>
-        </p:spPr>
-        <p:txBody>
-          <a:bodyPr>
-            <a:noAutofit/>
-          </a:bodyPr>
-          <a:lstStyle/>
-          <a:p>
-            <a:r>
-              <a:rPr lang="en-PH" sz="5400" b="1" dirty="0"/>
-              <a:t>Controller Layer</a:t>
-            </a:r>
-            <a:endParaRPr lang="en-PH" sz="5000" b="1" dirty="0"/>
-          </a:p>
-        </p:txBody>
-      </p:sp>
-      <p:sp>
-        <p:nvSpPr>
-          <p:cNvPr id="4" name="Footer Placeholder 3">
-            <a:extLst>
-              <a:ext uri="{FF2B5EF4-FFF2-40B4-BE49-F238E27FC236}">
-                <a16:creationId xmlns:a16="http://schemas.microsoft.com/office/drawing/2014/main" id="{638E7DE1-45EE-476A-A474-0F3C264AEDA3}"/>
-              </a:ext>
-            </a:extLst>
-          </p:cNvPr>
-          <p:cNvSpPr>
-            <a:spLocks noGrp="1"/>
-          </p:cNvSpPr>
-          <p:nvPr>
-            <p:ph type="ftr" sz="quarter" idx="11"/>
-          </p:nvPr>
-        </p:nvSpPr>
-        <p:spPr>
-          <a:xfrm>
-            <a:off x="0" y="6139541"/>
-            <a:ext cx="12192000" cy="718459"/>
-          </a:xfrm>
-          <a:ln w="28575">
-            <a:solidFill>
-              <a:schemeClr val="accent5">
-                <a:lumMod val="50000"/>
-              </a:schemeClr>
-            </a:solidFill>
-          </a:ln>
-        </p:spPr>
-        <p:txBody>
-          <a:bodyPr/>
-          <a:lstStyle/>
-          <a:p>
-            <a:pPr algn="r"/>
-            <a:r>
-              <a:rPr lang="en-PH" b="1">
-                <a:solidFill>
-                  <a:schemeClr val="tx1"/>
-                </a:solidFill>
-              </a:rPr>
-              <a:t>CCOBJPGL</a:t>
-            </a:r>
-            <a:endParaRPr lang="en-PH" dirty="0"/>
-          </a:p>
-        </p:txBody>
-      </p:sp>
-      <p:sp>
-        <p:nvSpPr>
-          <p:cNvPr id="5" name="Title 1">
-            <a:extLst>
-              <a:ext uri="{FF2B5EF4-FFF2-40B4-BE49-F238E27FC236}">
-                <a16:creationId xmlns:a16="http://schemas.microsoft.com/office/drawing/2014/main" id="{3444037F-B658-D82C-5DCA-53E8AA1493D7}"/>
-              </a:ext>
-            </a:extLst>
-          </p:cNvPr>
-          <p:cNvSpPr txBox="1">
-            <a:spLocks/>
-          </p:cNvSpPr>
-          <p:nvPr/>
-        </p:nvSpPr>
-        <p:spPr>
-          <a:xfrm>
-            <a:off x="491646" y="1215609"/>
-            <a:ext cx="11208707" cy="4290585"/>
-          </a:xfrm>
-          <a:prstGeom prst="rect">
-            <a:avLst/>
-          </a:prstGeom>
-        </p:spPr>
-        <p:txBody>
-          <a:bodyPr vert="horz" lIns="91440" tIns="45720" rIns="91440" bIns="45720" rtlCol="0" anchor="b">
-            <a:normAutofit fontScale="97500"/>
-          </a:bodyPr>
-          <a:lstStyle>
-            <a:lvl1pPr algn="ctr" defTabSz="914400" rtl="0" eaLnBrk="1" latinLnBrk="0" hangingPunct="1">
-              <a:lnSpc>
-                <a:spcPct val="90000"/>
-              </a:lnSpc>
-              <a:spcBef>
-                <a:spcPct val="0"/>
-              </a:spcBef>
-              <a:buNone/>
-              <a:defRPr sz="6000" kern="1200">
-                <a:solidFill>
-                  <a:schemeClr val="tx1"/>
-                </a:solidFill>
-                <a:latin typeface="+mj-lt"/>
-                <a:ea typeface="+mj-ea"/>
-                <a:cs typeface="+mj-cs"/>
-              </a:defRPr>
-            </a:lvl1pPr>
-          </a:lstStyle>
-          <a:p>
-            <a:pPr algn="l">
-              <a:lnSpc>
-                <a:spcPct val="100000"/>
-              </a:lnSpc>
-            </a:pPr>
-            <a:endParaRPr lang="en-PH" sz="2400" dirty="0">
-              <a:latin typeface="+mn-lt"/>
-            </a:endParaRPr>
-          </a:p>
-          <a:p>
-            <a:pPr marL="342900" indent="-342900" algn="l">
-              <a:lnSpc>
-                <a:spcPct val="100000"/>
-              </a:lnSpc>
-              <a:buFont typeface="Wingdings" panose="05000000000000000000" pitchFamily="2" charset="2"/>
-              <a:buChar char="§"/>
-            </a:pPr>
-            <a:endParaRPr lang="en-PH" sz="2400" dirty="0">
-              <a:solidFill>
-                <a:srgbClr val="000000"/>
-              </a:solidFill>
-              <a:latin typeface="+mn-lt"/>
-            </a:endParaRPr>
-          </a:p>
-          <a:p>
-            <a:pPr marL="342900" indent="-342900" algn="just">
-              <a:buFont typeface="Wingdings" pitchFamily="2" charset="2"/>
-              <a:buChar char="§"/>
-            </a:pPr>
-            <a:r>
-              <a:rPr lang="en-PH" sz="2400" b="0" i="0" u="none" strike="noStrike" dirty="0">
-                <a:solidFill>
-                  <a:srgbClr val="000000"/>
-                </a:solidFill>
-                <a:effectLst/>
-                <a:latin typeface="+mn-lt"/>
-              </a:rPr>
-              <a:t>It works on both the model and view. </a:t>
-            </a:r>
-          </a:p>
-          <a:p>
-            <a:pPr marL="342900" indent="-342900" algn="just">
-              <a:buFont typeface="Wingdings" pitchFamily="2" charset="2"/>
-              <a:buChar char="§"/>
-            </a:pPr>
-            <a:endParaRPr lang="en-PH" sz="2400" dirty="0">
-              <a:solidFill>
-                <a:srgbClr val="000000"/>
-              </a:solidFill>
-              <a:latin typeface="+mn-lt"/>
-            </a:endParaRPr>
-          </a:p>
-          <a:p>
-            <a:pPr marL="342900" indent="-342900" algn="just">
-              <a:buFont typeface="Wingdings" pitchFamily="2" charset="2"/>
-              <a:buChar char="§"/>
-            </a:pPr>
-            <a:r>
-              <a:rPr lang="en-PH" sz="2400" b="0" i="0" u="none" strike="noStrike" dirty="0">
-                <a:solidFill>
-                  <a:srgbClr val="000000"/>
-                </a:solidFill>
-                <a:effectLst/>
-                <a:latin typeface="+mn-lt"/>
-              </a:rPr>
-              <a:t>It is used to manage the flow of application.</a:t>
-            </a:r>
-          </a:p>
-          <a:p>
-            <a:pPr marL="342900" indent="-342900" algn="just">
-              <a:buFont typeface="Wingdings" pitchFamily="2" charset="2"/>
-              <a:buChar char="§"/>
-            </a:pPr>
-            <a:endParaRPr lang="en-PH" sz="2400" b="0" i="0" u="none" strike="noStrike" dirty="0">
-              <a:solidFill>
-                <a:srgbClr val="000000"/>
-              </a:solidFill>
-              <a:effectLst/>
-              <a:latin typeface="+mn-lt"/>
-            </a:endParaRPr>
-          </a:p>
-          <a:p>
-            <a:pPr marL="342900" indent="-342900" algn="l">
-              <a:lnSpc>
-                <a:spcPct val="100000"/>
-              </a:lnSpc>
-              <a:buFont typeface="Wingdings" panose="05000000000000000000" pitchFamily="2" charset="2"/>
-              <a:buChar char="§"/>
-            </a:pPr>
-            <a:r>
-              <a:rPr lang="en-PH" sz="2400" b="0" i="0" u="none" strike="noStrike" dirty="0">
-                <a:solidFill>
-                  <a:srgbClr val="000000"/>
-                </a:solidFill>
-                <a:effectLst/>
-                <a:latin typeface="+mn-lt"/>
-              </a:rPr>
-              <a:t>It translates the user's interactions with the view into actions that the model will perform. </a:t>
-            </a:r>
-          </a:p>
-          <a:p>
-            <a:pPr marL="342900" indent="-342900" algn="l">
-              <a:lnSpc>
-                <a:spcPct val="100000"/>
-              </a:lnSpc>
-              <a:buFont typeface="Wingdings" panose="05000000000000000000" pitchFamily="2" charset="2"/>
-              <a:buChar char="§"/>
-            </a:pPr>
-            <a:endParaRPr lang="en-PH" sz="2400" dirty="0">
-              <a:solidFill>
-                <a:srgbClr val="000000"/>
-              </a:solidFill>
-              <a:latin typeface="+mn-lt"/>
-            </a:endParaRPr>
-          </a:p>
-          <a:p>
-            <a:pPr marL="342900" indent="-342900" algn="l">
-              <a:lnSpc>
-                <a:spcPct val="100000"/>
-              </a:lnSpc>
-              <a:buFont typeface="Wingdings" panose="05000000000000000000" pitchFamily="2" charset="2"/>
-              <a:buChar char="§"/>
-            </a:pPr>
-            <a:r>
-              <a:rPr lang="en-PH" sz="2400" b="0" i="0" u="none" strike="noStrike" dirty="0">
-                <a:solidFill>
-                  <a:srgbClr val="000000"/>
-                </a:solidFill>
-                <a:effectLst/>
-                <a:latin typeface="+mn-lt"/>
-              </a:rPr>
-              <a:t>In a stand-alone GUI client, user interactions could be button clicks or menu selections.</a:t>
-            </a:r>
-          </a:p>
-          <a:p>
-            <a:pPr marL="342900" indent="-342900" algn="l">
-              <a:lnSpc>
-                <a:spcPct val="100000"/>
-              </a:lnSpc>
-              <a:buFont typeface="Wingdings" panose="05000000000000000000" pitchFamily="2" charset="2"/>
-              <a:buChar char="§"/>
-            </a:pPr>
-            <a:endParaRPr lang="en-PH" sz="2400" dirty="0">
-              <a:solidFill>
-                <a:srgbClr val="000000"/>
-              </a:solidFill>
-              <a:latin typeface="+mn-lt"/>
-            </a:endParaRPr>
-          </a:p>
-          <a:p>
-            <a:pPr marL="342900" indent="-342900" algn="l">
-              <a:lnSpc>
-                <a:spcPct val="100000"/>
-              </a:lnSpc>
-              <a:buFont typeface="Wingdings" panose="05000000000000000000" pitchFamily="2" charset="2"/>
-              <a:buChar char="§"/>
-            </a:pPr>
-            <a:r>
-              <a:rPr lang="en-PH" sz="2400" b="0" i="0" u="none" strike="noStrike" dirty="0">
-                <a:solidFill>
-                  <a:srgbClr val="000000"/>
-                </a:solidFill>
-                <a:effectLst/>
-                <a:latin typeface="+mn-lt"/>
-              </a:rPr>
-              <a:t>In the context of JavaFX, this layer contains all </a:t>
-            </a:r>
-            <a:r>
-              <a:rPr lang="en-PH" sz="2400" b="1" dirty="0">
-                <a:solidFill>
-                  <a:srgbClr val="0070C0"/>
-                </a:solidFill>
-                <a:latin typeface="+mn-lt"/>
-              </a:rPr>
-              <a:t>controller</a:t>
-            </a:r>
-            <a:r>
-              <a:rPr lang="en-PH" sz="2400" b="1" i="0" u="none" strike="noStrike" dirty="0">
-                <a:solidFill>
-                  <a:srgbClr val="0070C0"/>
-                </a:solidFill>
-                <a:effectLst/>
-                <a:latin typeface="+mn-lt"/>
-              </a:rPr>
-              <a:t> files.</a:t>
-            </a:r>
-          </a:p>
-          <a:p>
-            <a:pPr marL="342900" indent="-342900" algn="l">
-              <a:lnSpc>
-                <a:spcPct val="100000"/>
-              </a:lnSpc>
-              <a:buFont typeface="Wingdings" panose="05000000000000000000" pitchFamily="2" charset="2"/>
-              <a:buChar char="§"/>
-            </a:pPr>
-            <a:endParaRPr lang="en-PH" sz="2400" b="0" i="0" u="none" strike="noStrike" dirty="0">
-              <a:solidFill>
-                <a:srgbClr val="000000"/>
-              </a:solidFill>
-              <a:effectLst/>
-              <a:latin typeface="+mn-lt"/>
-            </a:endParaRPr>
-          </a:p>
-          <a:p>
-            <a:pPr marL="342900" indent="-342900" algn="l">
-              <a:lnSpc>
-                <a:spcPct val="100000"/>
-              </a:lnSpc>
-              <a:buFont typeface="Wingdings" panose="05000000000000000000" pitchFamily="2" charset="2"/>
-              <a:buChar char="§"/>
-            </a:pPr>
-            <a:endParaRPr lang="en-PH" sz="2400" dirty="0">
-              <a:solidFill>
-                <a:srgbClr val="000000"/>
-              </a:solidFill>
-              <a:latin typeface="+mn-lt"/>
-            </a:endParaRPr>
-          </a:p>
-          <a:p>
-            <a:pPr algn="l">
-              <a:lnSpc>
-                <a:spcPct val="100000"/>
-              </a:lnSpc>
-            </a:pPr>
-            <a:endParaRPr lang="en-PH" sz="2400" dirty="0">
-              <a:solidFill>
-                <a:srgbClr val="000000"/>
-              </a:solidFill>
-              <a:latin typeface="+mn-lt"/>
-            </a:endParaRPr>
-          </a:p>
-        </p:txBody>
-      </p:sp>
-    </p:spTree>
-    <p:extLst>
-      <p:ext uri="{BB962C8B-B14F-4D97-AF65-F5344CB8AC3E}">
-        <p14:creationId xmlns:p14="http://schemas.microsoft.com/office/powerpoint/2010/main" val="638456497"/>
-      </p:ext>
-    </p:extLst>
-  </p:cSld>
-  <p:clrMapOvr>
-    <a:masterClrMapping/>
-  </p:clrMapOvr>
-</p:sld>
-</file>
-
 <file path=ppt/slides/slide2.xml><?xml version="1.0" encoding="utf-8"?>
 <p:sld xmlns:a="http://schemas.openxmlformats.org/drawingml/2006/main" xmlns:r="http://schemas.openxmlformats.org/officeDocument/2006/relationships" xmlns:p="http://schemas.openxmlformats.org/presentationml/2006/main">
   <p:cSld>
@@ -6027,8 +5365,8 @@
           <a:lstStyle/>
           <a:p>
             <a:r>
-              <a:rPr lang="en-PH" sz="5400" b="1"/>
-              <a:t>Outline</a:t>
+              <a:rPr lang="en-PH" sz="5400" b="1" dirty="0"/>
+              <a:t>Model Layer</a:t>
             </a:r>
             <a:endParaRPr lang="en-PH" sz="5000" b="1" dirty="0"/>
           </a:p>
@@ -6096,8 +5434,8 @@
         </p:nvSpPr>
         <p:spPr>
           <a:xfrm>
-            <a:off x="1524000" y="1516449"/>
-            <a:ext cx="9144000" cy="4290585"/>
+            <a:off x="491646" y="1215609"/>
+            <a:ext cx="11208707" cy="4290585"/>
           </a:xfrm>
           <a:prstGeom prst="rect">
             <a:avLst/>
@@ -6105,7 +5443,7 @@
         </p:spPr>
         <p:txBody>
           <a:bodyPr vert="horz" lIns="91440" tIns="45720" rIns="91440" bIns="45720" rtlCol="0" anchor="b">
-            <a:normAutofit fontScale="97500"/>
+            <a:normAutofit fontScale="97500" lnSpcReduction="10000"/>
           </a:bodyPr>
           <a:lstStyle>
             <a:lvl1pPr algn="ctr" defTabSz="914400" rtl="0" eaLnBrk="1" latinLnBrk="0" hangingPunct="1">
@@ -6127,23 +5465,109 @@
             </a:lvl1pPr>
           </a:lstStyle>
           <a:p>
+            <a:pPr algn="l">
+              <a:lnSpc>
+                <a:spcPct val="100000"/>
+              </a:lnSpc>
+            </a:pPr>
+            <a:endParaRPr lang="en-PH" sz="2400" dirty="0">
+              <a:latin typeface="+mn-lt"/>
+            </a:endParaRPr>
+          </a:p>
+          <a:p>
             <a:pPr marL="342900" indent="-342900" algn="l">
               <a:lnSpc>
                 <a:spcPct val="100000"/>
               </a:lnSpc>
               <a:buFont typeface="Wingdings" panose="05000000000000000000" pitchFamily="2" charset="2"/>
-              <a:buChar char="Ø"/>
-            </a:pPr>
-            <a:r>
-              <a:rPr lang="en-US" sz="2500" dirty="0">
+              <a:buChar char="§"/>
+            </a:pPr>
+            <a:endParaRPr lang="en-PH" sz="2400" b="0" i="0" u="none" strike="noStrike" dirty="0">
+              <a:solidFill>
+                <a:srgbClr val="000000"/>
+              </a:solidFill>
+              <a:effectLst/>
+              <a:latin typeface="+mn-lt"/>
+            </a:endParaRPr>
+          </a:p>
+          <a:p>
+            <a:pPr marL="342900" indent="-342900" algn="l">
+              <a:lnSpc>
+                <a:spcPct val="100000"/>
+              </a:lnSpc>
+              <a:buFont typeface="Wingdings" panose="05000000000000000000" pitchFamily="2" charset="2"/>
+              <a:buChar char="§"/>
+            </a:pPr>
+            <a:endParaRPr lang="en-PH" sz="2400" dirty="0">
+              <a:solidFill>
+                <a:srgbClr val="000000"/>
+              </a:solidFill>
+              <a:latin typeface="+mn-lt"/>
+            </a:endParaRPr>
+          </a:p>
+          <a:p>
+            <a:pPr marL="342900" indent="-342900" algn="l">
+              <a:lnSpc>
+                <a:spcPct val="100000"/>
+              </a:lnSpc>
+              <a:buFont typeface="Wingdings" panose="05000000000000000000" pitchFamily="2" charset="2"/>
+              <a:buChar char="§"/>
+            </a:pPr>
+            <a:endParaRPr lang="en-PH" sz="2400" b="0" i="0" u="none" strike="noStrike" dirty="0">
+              <a:solidFill>
+                <a:srgbClr val="000000"/>
+              </a:solidFill>
+              <a:effectLst/>
+              <a:latin typeface="+mn-lt"/>
+            </a:endParaRPr>
+          </a:p>
+          <a:p>
+            <a:pPr marL="342900" indent="-342900" algn="l">
+              <a:lnSpc>
+                <a:spcPct val="100000"/>
+              </a:lnSpc>
+              <a:buFont typeface="Wingdings" panose="05000000000000000000" pitchFamily="2" charset="2"/>
+              <a:buChar char="§"/>
+            </a:pPr>
+            <a:endParaRPr lang="en-PH" sz="2400" dirty="0">
+              <a:solidFill>
+                <a:srgbClr val="000000"/>
+              </a:solidFill>
+              <a:latin typeface="+mn-lt"/>
+            </a:endParaRPr>
+          </a:p>
+          <a:p>
+            <a:pPr marL="342900" indent="-342900" algn="l">
+              <a:lnSpc>
+                <a:spcPct val="100000"/>
+              </a:lnSpc>
+              <a:buFont typeface="Wingdings" panose="05000000000000000000" pitchFamily="2" charset="2"/>
+              <a:buChar char="§"/>
+            </a:pPr>
+            <a:endParaRPr lang="en-PH" sz="2400" dirty="0">
+              <a:solidFill>
+                <a:srgbClr val="000000"/>
+              </a:solidFill>
+              <a:latin typeface="+mn-lt"/>
+            </a:endParaRPr>
+          </a:p>
+          <a:p>
+            <a:pPr marL="342900" indent="-342900" algn="l">
+              <a:lnSpc>
+                <a:spcPct val="100000"/>
+              </a:lnSpc>
+              <a:buFont typeface="Wingdings" panose="05000000000000000000" pitchFamily="2" charset="2"/>
+              <a:buChar char="§"/>
+            </a:pPr>
+            <a:r>
+              <a:rPr lang="en-PH" sz="2400" b="0" i="0" u="none" strike="noStrike" dirty="0">
                 <a:solidFill>
-                  <a:schemeClr val="bg2">
-                    <a:lumMod val="75000"/>
-                  </a:schemeClr>
+                  <a:srgbClr val="000000"/>
                 </a:solidFill>
-                <a:latin typeface="Calibri (Body)"/>
+                <a:effectLst/>
+                <a:latin typeface="+mn-lt"/>
               </a:rPr>
-              <a:t>Introduction</a:t>
+              <a:t>It represents the business layer of application.</a:t>
             </a:r>
           </a:p>
           <a:p>
@@ -6152,10 +5576,13 @@
                 <a:spcPct val="100000"/>
               </a:lnSpc>
               <a:buFont typeface="Wingdings" panose="05000000000000000000" pitchFamily="2" charset="2"/>
-              <a:buChar char="Ø"/>
-            </a:pPr>
-            <a:endParaRPr lang="en-US" sz="2500" dirty="0">
-              <a:latin typeface="Calibri (Body)"/>
+              <a:buChar char="§"/>
+            </a:pPr>
+            <a:endParaRPr lang="en-PH" sz="2400" dirty="0">
+              <a:solidFill>
+                <a:srgbClr val="000000"/>
+              </a:solidFill>
+              <a:latin typeface="+mn-lt"/>
             </a:endParaRPr>
           </a:p>
           <a:p>
@@ -6164,13 +5591,17 @@
                 <a:spcPct val="100000"/>
               </a:lnSpc>
               <a:buFont typeface="Wingdings" panose="05000000000000000000" pitchFamily="2" charset="2"/>
-              <a:buChar char="Ø"/>
-            </a:pPr>
-            <a:r>
-              <a:rPr lang="en-US" sz="2500" b="1" dirty="0">
-                <a:latin typeface="Calibri (Body)"/>
+              <a:buChar char="§"/>
+            </a:pPr>
+            <a:r>
+              <a:rPr lang="en-PH" sz="2400" b="0" i="0" u="none" strike="noStrike" dirty="0">
+                <a:solidFill>
+                  <a:srgbClr val="000000"/>
+                </a:solidFill>
+                <a:effectLst/>
+                <a:latin typeface="+mn-lt"/>
               </a:rPr>
-              <a:t>Model</a:t>
+              <a:t>The model represents the data and the rules that govern access to and updates of this data.</a:t>
             </a:r>
           </a:p>
           <a:p>
@@ -6179,15 +5610,13 @@
                 <a:spcPct val="100000"/>
               </a:lnSpc>
               <a:buFont typeface="Wingdings" panose="05000000000000000000" pitchFamily="2" charset="2"/>
-              <a:buChar char="Ø"/>
-            </a:pPr>
-            <a:endParaRPr lang="en-US" sz="2500" b="1" dirty="0">
+              <a:buChar char="§"/>
+            </a:pPr>
+            <a:endParaRPr lang="en-PH" sz="2400" dirty="0">
               <a:solidFill>
-                <a:schemeClr val="bg2">
-                  <a:lumMod val="75000"/>
-                </a:schemeClr>
+                <a:srgbClr val="000000"/>
               </a:solidFill>
-              <a:latin typeface="Calibri (Body)"/>
+              <a:latin typeface="+mn-lt"/>
             </a:endParaRPr>
           </a:p>
           <a:p>
@@ -6196,18 +5625,37 @@
                 <a:spcPct val="100000"/>
               </a:lnSpc>
               <a:buFont typeface="Wingdings" panose="05000000000000000000" pitchFamily="2" charset="2"/>
-              <a:buChar char="Ø"/>
-            </a:pPr>
-            <a:r>
-              <a:rPr lang="en-US" sz="2500" dirty="0">
+              <a:buChar char="§"/>
+            </a:pPr>
+            <a:r>
+              <a:rPr lang="en-PH" sz="2400" b="0" i="0" u="none" strike="noStrike" dirty="0">
                 <a:solidFill>
-                  <a:schemeClr val="bg2">
-                    <a:lumMod val="75000"/>
-                  </a:schemeClr>
+                  <a:srgbClr val="000000"/>
                 </a:solidFill>
-                <a:latin typeface="Calibri (Body)"/>
+                <a:effectLst/>
+                <a:latin typeface="+mn-lt"/>
               </a:rPr>
-              <a:t>View </a:t>
+              <a:t>In the context of JavaFX, this layer contains all </a:t>
+            </a:r>
+            <a:r>
+              <a:rPr lang="en-PH" sz="2400" b="1" i="0" u="none" strike="noStrike">
+                <a:solidFill>
+                  <a:srgbClr val="0070C0"/>
+                </a:solidFill>
+                <a:effectLst/>
+                <a:latin typeface="+mn-lt"/>
+              </a:rPr>
+              <a:t>classes and interfaces</a:t>
+            </a:r>
+            <a:r>
+              <a:rPr lang="en-PH" sz="2400" b="1" i="0" u="none" strike="noStrike" dirty="0">
+                <a:solidFill>
+                  <a:srgbClr val="0070C0"/>
+                </a:solidFill>
+                <a:effectLst/>
+                <a:latin typeface="+mn-lt"/>
+              </a:rPr>
+              <a:t>.</a:t>
             </a:r>
           </a:p>
           <a:p>
@@ -6216,15 +5664,14 @@
                 <a:spcPct val="100000"/>
               </a:lnSpc>
               <a:buFont typeface="Wingdings" panose="05000000000000000000" pitchFamily="2" charset="2"/>
-              <a:buChar char="Ø"/>
-            </a:pPr>
-            <a:endParaRPr lang="en-US" sz="2500" dirty="0">
+              <a:buChar char="§"/>
+            </a:pPr>
+            <a:endParaRPr lang="en-PH" sz="2400" b="0" i="0" u="none" strike="noStrike" dirty="0">
               <a:solidFill>
-                <a:schemeClr val="bg2">
-                  <a:lumMod val="75000"/>
-                </a:schemeClr>
+                <a:srgbClr val="000000"/>
               </a:solidFill>
-              <a:latin typeface="Calibri (Body)"/>
+              <a:effectLst/>
+              <a:latin typeface="+mn-lt"/>
             </a:endParaRPr>
           </a:p>
           <a:p>
@@ -6233,28 +5680,28 @@
                 <a:spcPct val="100000"/>
               </a:lnSpc>
               <a:buFont typeface="Wingdings" panose="05000000000000000000" pitchFamily="2" charset="2"/>
-              <a:buChar char="Ø"/>
-            </a:pPr>
-            <a:r>
-              <a:rPr lang="en-US" sz="2500" dirty="0">
-                <a:solidFill>
-                  <a:schemeClr val="bg2">
-                    <a:lumMod val="75000"/>
-                  </a:schemeClr>
-                </a:solidFill>
-                <a:latin typeface="Calibri (Body)"/>
-              </a:rPr>
-              <a:t>Controller</a:t>
-            </a:r>
-          </a:p>
-          <a:p>
-            <a:pPr algn="l">
+              <a:buChar char="§"/>
+            </a:pPr>
+            <a:endParaRPr lang="en-PH" sz="2400" dirty="0">
+              <a:solidFill>
+                <a:srgbClr val="000000"/>
+              </a:solidFill>
+              <a:latin typeface="+mn-lt"/>
+            </a:endParaRPr>
+          </a:p>
+          <a:p>
+            <a:pPr marL="342900" indent="-342900" algn="l">
               <a:lnSpc>
                 <a:spcPct val="100000"/>
               </a:lnSpc>
-            </a:pPr>
-            <a:endParaRPr lang="en-US" sz="2500" b="1" dirty="0">
-              <a:latin typeface="Calibri (Body)"/>
+              <a:buFont typeface="Wingdings" panose="05000000000000000000" pitchFamily="2" charset="2"/>
+              <a:buChar char="§"/>
+            </a:pPr>
+            <a:endParaRPr lang="en-PH" sz="2400" dirty="0">
+              <a:solidFill>
+                <a:srgbClr val="000000"/>
+              </a:solidFill>
+              <a:latin typeface="+mn-lt"/>
             </a:endParaRPr>
           </a:p>
           <a:p>
@@ -6263,10 +5710,13 @@
                 <a:spcPct val="100000"/>
               </a:lnSpc>
               <a:buFont typeface="Wingdings" panose="05000000000000000000" pitchFamily="2" charset="2"/>
-              <a:buChar char="Ø"/>
-            </a:pPr>
-            <a:endParaRPr lang="en-US" sz="2500" dirty="0">
-              <a:latin typeface="Calibri (Body)"/>
+              <a:buChar char="§"/>
+            </a:pPr>
+            <a:endParaRPr lang="en-PH" sz="2400" dirty="0">
+              <a:solidFill>
+                <a:srgbClr val="000000"/>
+              </a:solidFill>
+              <a:latin typeface="+mn-lt"/>
             </a:endParaRPr>
           </a:p>
           <a:p>
@@ -6275,10 +5725,13 @@
                 <a:spcPct val="100000"/>
               </a:lnSpc>
               <a:buFont typeface="Wingdings" panose="05000000000000000000" pitchFamily="2" charset="2"/>
-              <a:buChar char="Ø"/>
-            </a:pPr>
-            <a:endParaRPr lang="en-US" sz="2500" dirty="0">
-              <a:latin typeface="Calibri (Body)"/>
+              <a:buChar char="§"/>
+            </a:pPr>
+            <a:endParaRPr lang="en-PH" sz="2400" dirty="0">
+              <a:solidFill>
+                <a:srgbClr val="000000"/>
+              </a:solidFill>
+              <a:latin typeface="+mn-lt"/>
             </a:endParaRPr>
           </a:p>
           <a:p>
@@ -6287,10 +5740,13 @@
                 <a:spcPct val="100000"/>
               </a:lnSpc>
               <a:buFont typeface="Wingdings" panose="05000000000000000000" pitchFamily="2" charset="2"/>
-              <a:buChar char="Ø"/>
-            </a:pPr>
-            <a:endParaRPr lang="en-US" sz="2500" dirty="0">
-              <a:latin typeface="Calibri (Body)"/>
+              <a:buChar char="§"/>
+            </a:pPr>
+            <a:endParaRPr lang="en-PH" sz="2400" dirty="0">
+              <a:solidFill>
+                <a:srgbClr val="000000"/>
+              </a:solidFill>
+              <a:latin typeface="+mn-lt"/>
             </a:endParaRPr>
           </a:p>
           <a:p>
@@ -6299,10 +5755,13 @@
                 <a:spcPct val="100000"/>
               </a:lnSpc>
               <a:buFont typeface="Wingdings" panose="05000000000000000000" pitchFamily="2" charset="2"/>
-              <a:buChar char="Ø"/>
-            </a:pPr>
-            <a:endParaRPr lang="en-US" sz="2500" dirty="0">
-              <a:latin typeface="Calibri (Body)"/>
+              <a:buChar char="§"/>
+            </a:pPr>
+            <a:endParaRPr lang="en-PH" sz="2400" dirty="0">
+              <a:solidFill>
+                <a:srgbClr val="000000"/>
+              </a:solidFill>
+              <a:latin typeface="+mn-lt"/>
             </a:endParaRPr>
           </a:p>
         </p:txBody>
@@ -6310,7 +5769,7 @@
     </p:spTree>
     <p:extLst>
       <p:ext uri="{BB962C8B-B14F-4D97-AF65-F5344CB8AC3E}">
-        <p14:creationId xmlns:p14="http://schemas.microsoft.com/office/powerpoint/2010/main" val="3705085853"/>
+        <p14:creationId xmlns:p14="http://schemas.microsoft.com/office/powerpoint/2010/main" val="3445659323"/>
       </p:ext>
     </p:extLst>
   </p:cSld>
@@ -6382,7 +5841,7 @@
           <a:p>
             <a:r>
               <a:rPr lang="en-PH" sz="5400" b="1" dirty="0"/>
-              <a:t>Model Layer</a:t>
+              <a:t>View Layer</a:t>
             </a:r>
             <a:endParaRPr lang="en-PH" sz="5000" b="1" dirty="0"/>
           </a:p>
@@ -6423,7 +5882,7 @@
           <a:p>
             <a:pPr algn="r"/>
             <a:r>
-              <a:rPr lang="en-PH" b="1">
+              <a:rPr lang="en-PH" b="1" dirty="0">
                 <a:solidFill>
                   <a:schemeClr val="tx1"/>
                 </a:solidFill>
@@ -6459,7 +5918,7 @@
         </p:spPr>
         <p:txBody>
           <a:bodyPr vert="horz" lIns="91440" tIns="45720" rIns="91440" bIns="45720" rtlCol="0" anchor="b">
-            <a:normAutofit fontScale="97500" lnSpcReduction="10000"/>
+            <a:normAutofit fontScale="90000" lnSpcReduction="20000"/>
           </a:bodyPr>
           <a:lstStyle>
             <a:lvl1pPr algn="ctr" defTabSz="914400" rtl="0" eaLnBrk="1" latinLnBrk="0" hangingPunct="1">
@@ -6583,7 +6042,7 @@
                 <a:effectLst/>
                 <a:latin typeface="+mn-lt"/>
               </a:rPr>
-              <a:t>It represents the business layer of application.</a:t>
+              <a:t>It represents the presentation layer of application.</a:t>
             </a:r>
           </a:p>
           <a:p>
@@ -6617,7 +6076,7 @@
                 <a:effectLst/>
                 <a:latin typeface="+mn-lt"/>
               </a:rPr>
-              <a:t>The model represents the data and the rules that govern access to and updates of this data.</a:t>
+              <a:t>It is used to visualize the data that the model contains.</a:t>
             </a:r>
           </a:p>
           <a:p>
@@ -6632,6 +6091,41 @@
               <a:solidFill>
                 <a:srgbClr val="000000"/>
               </a:solidFill>
+              <a:latin typeface="+mn-lt"/>
+            </a:endParaRPr>
+          </a:p>
+          <a:p>
+            <a:pPr marL="342900" indent="-342900" algn="l">
+              <a:lnSpc>
+                <a:spcPct val="100000"/>
+              </a:lnSpc>
+              <a:buFont typeface="Wingdings" panose="05000000000000000000" pitchFamily="2" charset="2"/>
+              <a:buChar char="§"/>
+            </a:pPr>
+            <a:r>
+              <a:rPr lang="en-PH" sz="2400" b="0" i="0" u="none" strike="noStrike" dirty="0">
+                <a:solidFill>
+                  <a:srgbClr val="000000"/>
+                </a:solidFill>
+                <a:effectLst/>
+                <a:latin typeface="+mn-lt"/>
+              </a:rPr>
+              <a:t>The view renders the contents of a model. It specifies exactly how the model data should be presented.</a:t>
+            </a:r>
+          </a:p>
+          <a:p>
+            <a:pPr marL="342900" indent="-342900" algn="l">
+              <a:lnSpc>
+                <a:spcPct val="100000"/>
+              </a:lnSpc>
+              <a:buFont typeface="Wingdings" panose="05000000000000000000" pitchFamily="2" charset="2"/>
+              <a:buChar char="§"/>
+            </a:pPr>
+            <a:endParaRPr lang="en-PH" sz="2400" b="0" i="0" u="none" strike="noStrike" dirty="0">
+              <a:solidFill>
+                <a:srgbClr val="000000"/>
+              </a:solidFill>
+              <a:effectLst/>
               <a:latin typeface="+mn-lt"/>
             </a:endParaRPr>
           </a:p>
@@ -6654,14 +6148,14 @@
               <a:t>In the context of JavaFX, this layer contains all </a:t>
             </a:r>
             <a:r>
-              <a:rPr lang="en-PH" sz="2400" b="1" i="0" u="none" strike="noStrike">
+              <a:rPr lang="en-PH" sz="2400" b="1" i="0" u="none" strike="noStrike" dirty="0" err="1">
                 <a:solidFill>
                   <a:srgbClr val="0070C0"/>
                 </a:solidFill>
                 <a:effectLst/>
                 <a:latin typeface="+mn-lt"/>
               </a:rPr>
-              <a:t>classes and interfaces</a:t>
+              <a:t>fxml</a:t>
             </a:r>
             <a:r>
               <a:rPr lang="en-PH" sz="2400" b="1" i="0" u="none" strike="noStrike" dirty="0">
@@ -6671,7 +6165,7 @@
                 <a:effectLst/>
                 <a:latin typeface="+mn-lt"/>
               </a:rPr>
-              <a:t>.</a:t>
+              <a:t> files.</a:t>
             </a:r>
           </a:p>
           <a:p>
@@ -6785,7 +6279,7 @@
     </p:spTree>
     <p:extLst>
       <p:ext uri="{BB962C8B-B14F-4D97-AF65-F5344CB8AC3E}">
-        <p14:creationId xmlns:p14="http://schemas.microsoft.com/office/powerpoint/2010/main" val="3445659323"/>
+        <p14:creationId xmlns:p14="http://schemas.microsoft.com/office/powerpoint/2010/main" val="3587619782"/>
       </p:ext>
     </p:extLst>
   </p:cSld>
@@ -6856,8 +6350,8 @@
           <a:lstStyle/>
           <a:p>
             <a:r>
-              <a:rPr lang="en-PH" sz="5400" b="1"/>
-              <a:t>Outline</a:t>
+              <a:rPr lang="en-PH" sz="5400" b="1" dirty="0"/>
+              <a:t>Controller Layer</a:t>
             </a:r>
             <a:endParaRPr lang="en-PH" sz="5000" b="1" dirty="0"/>
           </a:p>
@@ -6925,8 +6419,8 @@
         </p:nvSpPr>
         <p:spPr>
           <a:xfrm>
-            <a:off x="1524000" y="1516449"/>
-            <a:ext cx="9144000" cy="4290585"/>
+            <a:off x="491646" y="1215609"/>
+            <a:ext cx="11208707" cy="4290585"/>
           </a:xfrm>
           <a:prstGeom prst="rect">
             <a:avLst/>
@@ -6956,379 +6450,6 @@
             </a:lvl1pPr>
           </a:lstStyle>
           <a:p>
-            <a:pPr marL="342900" indent="-342900" algn="l">
-              <a:lnSpc>
-                <a:spcPct val="100000"/>
-              </a:lnSpc>
-              <a:buFont typeface="Wingdings" panose="05000000000000000000" pitchFamily="2" charset="2"/>
-              <a:buChar char="Ø"/>
-            </a:pPr>
-            <a:r>
-              <a:rPr lang="en-US" sz="2500" dirty="0">
-                <a:solidFill>
-                  <a:schemeClr val="bg2">
-                    <a:lumMod val="75000"/>
-                  </a:schemeClr>
-                </a:solidFill>
-                <a:latin typeface="Calibri (Body)"/>
-              </a:rPr>
-              <a:t>Introduction</a:t>
-            </a:r>
-          </a:p>
-          <a:p>
-            <a:pPr marL="342900" indent="-342900" algn="l">
-              <a:lnSpc>
-                <a:spcPct val="100000"/>
-              </a:lnSpc>
-              <a:buFont typeface="Wingdings" panose="05000000000000000000" pitchFamily="2" charset="2"/>
-              <a:buChar char="Ø"/>
-            </a:pPr>
-            <a:endParaRPr lang="en-US" sz="2500" dirty="0">
-              <a:latin typeface="Calibri (Body)"/>
-            </a:endParaRPr>
-          </a:p>
-          <a:p>
-            <a:pPr marL="342900" indent="-342900" algn="l">
-              <a:lnSpc>
-                <a:spcPct val="100000"/>
-              </a:lnSpc>
-              <a:buFont typeface="Wingdings" panose="05000000000000000000" pitchFamily="2" charset="2"/>
-              <a:buChar char="Ø"/>
-            </a:pPr>
-            <a:r>
-              <a:rPr lang="en-US" sz="2500" dirty="0">
-                <a:solidFill>
-                  <a:schemeClr val="bg2">
-                    <a:lumMod val="75000"/>
-                  </a:schemeClr>
-                </a:solidFill>
-                <a:latin typeface="Calibri (Body)"/>
-              </a:rPr>
-              <a:t>Model</a:t>
-            </a:r>
-            <a:endParaRPr lang="en-US" sz="2500" b="1" dirty="0">
-              <a:solidFill>
-                <a:schemeClr val="bg2">
-                  <a:lumMod val="75000"/>
-                </a:schemeClr>
-              </a:solidFill>
-              <a:latin typeface="Calibri (Body)"/>
-            </a:endParaRPr>
-          </a:p>
-          <a:p>
-            <a:pPr marL="342900" indent="-342900" algn="l">
-              <a:lnSpc>
-                <a:spcPct val="100000"/>
-              </a:lnSpc>
-              <a:buFont typeface="Wingdings" panose="05000000000000000000" pitchFamily="2" charset="2"/>
-              <a:buChar char="Ø"/>
-            </a:pPr>
-            <a:endParaRPr lang="en-US" sz="2500" b="1" dirty="0">
-              <a:solidFill>
-                <a:schemeClr val="bg2">
-                  <a:lumMod val="75000"/>
-                </a:schemeClr>
-              </a:solidFill>
-              <a:latin typeface="Calibri (Body)"/>
-            </a:endParaRPr>
-          </a:p>
-          <a:p>
-            <a:pPr marL="342900" indent="-342900" algn="l">
-              <a:lnSpc>
-                <a:spcPct val="100000"/>
-              </a:lnSpc>
-              <a:buFont typeface="Wingdings" panose="05000000000000000000" pitchFamily="2" charset="2"/>
-              <a:buChar char="Ø"/>
-            </a:pPr>
-            <a:r>
-              <a:rPr lang="en-US" sz="2500" b="1" dirty="0">
-                <a:latin typeface="Calibri (Body)"/>
-              </a:rPr>
-              <a:t>View</a:t>
-            </a:r>
-            <a:r>
-              <a:rPr lang="en-US" sz="2500" dirty="0">
-                <a:solidFill>
-                  <a:schemeClr val="bg2">
-                    <a:lumMod val="75000"/>
-                  </a:schemeClr>
-                </a:solidFill>
-                <a:latin typeface="Calibri (Body)"/>
-              </a:rPr>
-              <a:t> </a:t>
-            </a:r>
-          </a:p>
-          <a:p>
-            <a:pPr marL="342900" indent="-342900" algn="l">
-              <a:lnSpc>
-                <a:spcPct val="100000"/>
-              </a:lnSpc>
-              <a:buFont typeface="Wingdings" panose="05000000000000000000" pitchFamily="2" charset="2"/>
-              <a:buChar char="Ø"/>
-            </a:pPr>
-            <a:endParaRPr lang="en-US" sz="2500" dirty="0">
-              <a:solidFill>
-                <a:schemeClr val="bg2">
-                  <a:lumMod val="75000"/>
-                </a:schemeClr>
-              </a:solidFill>
-              <a:latin typeface="Calibri (Body)"/>
-            </a:endParaRPr>
-          </a:p>
-          <a:p>
-            <a:pPr marL="342900" indent="-342900" algn="l">
-              <a:lnSpc>
-                <a:spcPct val="100000"/>
-              </a:lnSpc>
-              <a:buFont typeface="Wingdings" panose="05000000000000000000" pitchFamily="2" charset="2"/>
-              <a:buChar char="Ø"/>
-            </a:pPr>
-            <a:r>
-              <a:rPr lang="en-US" sz="2500" dirty="0">
-                <a:solidFill>
-                  <a:schemeClr val="bg2">
-                    <a:lumMod val="75000"/>
-                  </a:schemeClr>
-                </a:solidFill>
-                <a:latin typeface="Calibri (Body)"/>
-              </a:rPr>
-              <a:t>Controller</a:t>
-            </a:r>
-          </a:p>
-          <a:p>
-            <a:pPr algn="l">
-              <a:lnSpc>
-                <a:spcPct val="100000"/>
-              </a:lnSpc>
-            </a:pPr>
-            <a:endParaRPr lang="en-US" sz="2500" b="1" dirty="0">
-              <a:latin typeface="Calibri (Body)"/>
-            </a:endParaRPr>
-          </a:p>
-          <a:p>
-            <a:pPr marL="342900" indent="-342900" algn="l">
-              <a:lnSpc>
-                <a:spcPct val="100000"/>
-              </a:lnSpc>
-              <a:buFont typeface="Wingdings" panose="05000000000000000000" pitchFamily="2" charset="2"/>
-              <a:buChar char="Ø"/>
-            </a:pPr>
-            <a:endParaRPr lang="en-US" sz="2500" dirty="0">
-              <a:latin typeface="Calibri (Body)"/>
-            </a:endParaRPr>
-          </a:p>
-          <a:p>
-            <a:pPr marL="342900" indent="-342900" algn="l">
-              <a:lnSpc>
-                <a:spcPct val="100000"/>
-              </a:lnSpc>
-              <a:buFont typeface="Wingdings" panose="05000000000000000000" pitchFamily="2" charset="2"/>
-              <a:buChar char="Ø"/>
-            </a:pPr>
-            <a:endParaRPr lang="en-US" sz="2500" dirty="0">
-              <a:latin typeface="Calibri (Body)"/>
-            </a:endParaRPr>
-          </a:p>
-          <a:p>
-            <a:pPr marL="342900" indent="-342900" algn="l">
-              <a:lnSpc>
-                <a:spcPct val="100000"/>
-              </a:lnSpc>
-              <a:buFont typeface="Wingdings" panose="05000000000000000000" pitchFamily="2" charset="2"/>
-              <a:buChar char="Ø"/>
-            </a:pPr>
-            <a:endParaRPr lang="en-US" sz="2500" dirty="0">
-              <a:latin typeface="Calibri (Body)"/>
-            </a:endParaRPr>
-          </a:p>
-          <a:p>
-            <a:pPr marL="342900" indent="-342900" algn="l">
-              <a:lnSpc>
-                <a:spcPct val="100000"/>
-              </a:lnSpc>
-              <a:buFont typeface="Wingdings" panose="05000000000000000000" pitchFamily="2" charset="2"/>
-              <a:buChar char="Ø"/>
-            </a:pPr>
-            <a:endParaRPr lang="en-US" sz="2500" dirty="0">
-              <a:latin typeface="Calibri (Body)"/>
-            </a:endParaRPr>
-          </a:p>
-        </p:txBody>
-      </p:sp>
-    </p:spTree>
-    <p:extLst>
-      <p:ext uri="{BB962C8B-B14F-4D97-AF65-F5344CB8AC3E}">
-        <p14:creationId xmlns:p14="http://schemas.microsoft.com/office/powerpoint/2010/main" val="1926710670"/>
-      </p:ext>
-    </p:extLst>
-  </p:cSld>
-  <p:clrMapOvr>
-    <a:masterClrMapping/>
-  </p:clrMapOvr>
-</p:sld>
-</file>
-
-<file path=ppt/slides/slide8.xml><?xml version="1.0" encoding="utf-8"?>
-<p:sld xmlns:a="http://schemas.openxmlformats.org/drawingml/2006/main" xmlns:r="http://schemas.openxmlformats.org/officeDocument/2006/relationships" xmlns:p="http://schemas.openxmlformats.org/presentationml/2006/main">
-  <p:cSld>
-    <p:bg>
-      <p:bgPr>
-        <a:blipFill dpi="0" rotWithShape="1">
-          <a:blip r:embed="rId3">
-            <a:alphaModFix amt="99000"/>
-            <a:lum/>
-          </a:blip>
-          <a:srcRect/>
-          <a:stretch>
-            <a:fillRect t="89000" r="85000" b="-1000"/>
-          </a:stretch>
-        </a:blipFill>
-        <a:effectLst/>
-      </p:bgPr>
-    </p:bg>
-    <p:spTree>
-      <p:nvGrpSpPr>
-        <p:cNvPr id="1" name=""/>
-        <p:cNvGrpSpPr/>
-        <p:nvPr/>
-      </p:nvGrpSpPr>
-      <p:grpSpPr>
-        <a:xfrm>
-          <a:off x="0" y="0"/>
-          <a:ext cx="0" cy="0"/>
-          <a:chOff x="0" y="0"/>
-          <a:chExt cx="0" cy="0"/>
-        </a:xfrm>
-      </p:grpSpPr>
-      <p:sp>
-        <p:nvSpPr>
-          <p:cNvPr id="2" name="Title 1">
-            <a:extLst>
-              <a:ext uri="{FF2B5EF4-FFF2-40B4-BE49-F238E27FC236}">
-                <a16:creationId xmlns:a16="http://schemas.microsoft.com/office/drawing/2014/main" id="{6A3DCE86-C2BA-4713-9E7A-73589E8D6CCF}"/>
-              </a:ext>
-            </a:extLst>
-          </p:cNvPr>
-          <p:cNvSpPr>
-            <a:spLocks noGrp="1"/>
-          </p:cNvSpPr>
-          <p:nvPr>
-            <p:ph type="ctrTitle"/>
-          </p:nvPr>
-        </p:nvSpPr>
-        <p:spPr>
-          <a:xfrm>
-            <a:off x="1524000" y="497150"/>
-            <a:ext cx="9144000" cy="718459"/>
-          </a:xfrm>
-        </p:spPr>
-        <p:txBody>
-          <a:bodyPr>
-            <a:noAutofit/>
-          </a:bodyPr>
-          <a:lstStyle/>
-          <a:p>
-            <a:r>
-              <a:rPr lang="en-PH" sz="5400" b="1" dirty="0"/>
-              <a:t>View Layer</a:t>
-            </a:r>
-            <a:endParaRPr lang="en-PH" sz="5000" b="1" dirty="0"/>
-          </a:p>
-        </p:txBody>
-      </p:sp>
-      <p:sp>
-        <p:nvSpPr>
-          <p:cNvPr id="4" name="Footer Placeholder 3">
-            <a:extLst>
-              <a:ext uri="{FF2B5EF4-FFF2-40B4-BE49-F238E27FC236}">
-                <a16:creationId xmlns:a16="http://schemas.microsoft.com/office/drawing/2014/main" id="{638E7DE1-45EE-476A-A474-0F3C264AEDA3}"/>
-              </a:ext>
-            </a:extLst>
-          </p:cNvPr>
-          <p:cNvSpPr>
-            <a:spLocks noGrp="1"/>
-          </p:cNvSpPr>
-          <p:nvPr>
-            <p:ph type="ftr" sz="quarter" idx="11"/>
-          </p:nvPr>
-        </p:nvSpPr>
-        <p:spPr>
-          <a:xfrm>
-            <a:off x="0" y="6139541"/>
-            <a:ext cx="12192000" cy="718459"/>
-          </a:xfrm>
-          <a:ln w="28575">
-            <a:solidFill>
-              <a:schemeClr val="accent5">
-                <a:lumMod val="50000"/>
-              </a:schemeClr>
-            </a:solidFill>
-          </a:ln>
-        </p:spPr>
-        <p:txBody>
-          <a:bodyPr/>
-          <a:lstStyle/>
-          <a:p>
-            <a:pPr algn="r"/>
-            <a:r>
-              <a:rPr lang="en-PH" b="1" dirty="0">
-                <a:solidFill>
-                  <a:schemeClr val="tx1"/>
-                </a:solidFill>
-              </a:rPr>
-              <a:t>CCOBJPGL</a:t>
-            </a:r>
-            <a:endParaRPr lang="en-PH" dirty="0"/>
-          </a:p>
-        </p:txBody>
-      </p:sp>
-      <p:sp>
-        <p:nvSpPr>
-          <p:cNvPr id="5" name="Title 1">
-            <a:extLst>
-              <a:ext uri="{FF2B5EF4-FFF2-40B4-BE49-F238E27FC236}">
-                <a16:creationId xmlns:a16="http://schemas.microsoft.com/office/drawing/2014/main" id="{3444037F-B658-D82C-5DCA-53E8AA1493D7}"/>
-              </a:ext>
-            </a:extLst>
-          </p:cNvPr>
-          <p:cNvSpPr txBox="1">
-            <a:spLocks/>
-          </p:cNvSpPr>
-          <p:nvPr/>
-        </p:nvSpPr>
-        <p:spPr>
-          <a:xfrm>
-            <a:off x="491646" y="1215609"/>
-            <a:ext cx="11208707" cy="4290585"/>
-          </a:xfrm>
-          <a:prstGeom prst="rect">
-            <a:avLst/>
-          </a:prstGeom>
-        </p:spPr>
-        <p:txBody>
-          <a:bodyPr vert="horz" lIns="91440" tIns="45720" rIns="91440" bIns="45720" rtlCol="0" anchor="b">
-            <a:normAutofit fontScale="90000" lnSpcReduction="20000"/>
-          </a:bodyPr>
-          <a:lstStyle>
-            <a:lvl1pPr algn="ctr" defTabSz="914400" rtl="0" eaLnBrk="1" latinLnBrk="0" hangingPunct="1">
-              <a:lnSpc>
-                <a:spcPct val="90000"/>
-              </a:lnSpc>
-              <a:spcBef>
-                <a:spcPct val="0"/>
-              </a:spcBef>
-              <a:buNone/>
-              <a:defRPr sz="6000" kern="1200">
-                <a:solidFill>
-                  <a:schemeClr val="tx1"/>
-                </a:solidFill>
-                <a:latin typeface="+mj-lt"/>
-                <a:ea typeface="+mj-ea"/>
-                <a:cs typeface="+mj-cs"/>
-              </a:defRPr>
-            </a:lvl1pPr>
-          </a:lstStyle>
-          <a:p>
             <a:pPr algn="l">
               <a:lnSpc>
                 <a:spcPct val="100000"/>
@@ -7344,6 +6465,62 @@
                 <a:spcPct val="100000"/>
               </a:lnSpc>
               <a:buFont typeface="Wingdings" panose="05000000000000000000" pitchFamily="2" charset="2"/>
+              <a:buChar char="§"/>
+            </a:pPr>
+            <a:endParaRPr lang="en-PH" sz="2400" dirty="0">
+              <a:solidFill>
+                <a:srgbClr val="000000"/>
+              </a:solidFill>
+              <a:latin typeface="+mn-lt"/>
+            </a:endParaRPr>
+          </a:p>
+          <a:p>
+            <a:pPr marL="342900" indent="-342900" algn="just">
+              <a:buFont typeface="Wingdings" pitchFamily="2" charset="2"/>
+              <a:buChar char="§"/>
+            </a:pPr>
+            <a:r>
+              <a:rPr lang="en-PH" sz="2400" b="0" i="0" u="none" strike="noStrike" dirty="0">
+                <a:solidFill>
+                  <a:srgbClr val="000000"/>
+                </a:solidFill>
+                <a:effectLst/>
+                <a:latin typeface="+mn-lt"/>
+              </a:rPr>
+              <a:t>It works on both the model and view. </a:t>
+            </a:r>
+          </a:p>
+          <a:p>
+            <a:pPr marL="342900" indent="-342900" algn="just">
+              <a:buFont typeface="Wingdings" pitchFamily="2" charset="2"/>
+              <a:buChar char="§"/>
+            </a:pPr>
+            <a:endParaRPr lang="en-PH" sz="2400" dirty="0">
+              <a:solidFill>
+                <a:srgbClr val="000000"/>
+              </a:solidFill>
+              <a:latin typeface="+mn-lt"/>
+            </a:endParaRPr>
+          </a:p>
+          <a:p>
+            <a:pPr marL="342900" indent="-342900" algn="just">
+              <a:buFont typeface="Wingdings" pitchFamily="2" charset="2"/>
+              <a:buChar char="§"/>
+            </a:pPr>
+            <a:r>
+              <a:rPr lang="en-PH" sz="2400" b="0" i="0" u="none" strike="noStrike" dirty="0">
+                <a:solidFill>
+                  <a:srgbClr val="000000"/>
+                </a:solidFill>
+                <a:effectLst/>
+                <a:latin typeface="+mn-lt"/>
+              </a:rPr>
+              <a:t>It is used to manage the flow of application.</a:t>
+            </a:r>
+          </a:p>
+          <a:p>
+            <a:pPr marL="342900" indent="-342900" algn="just">
+              <a:buFont typeface="Wingdings" pitchFamily="2" charset="2"/>
               <a:buChar char="§"/>
             </a:pPr>
             <a:endParaRPr lang="en-PH" sz="2400" b="0" i="0" u="none" strike="noStrike" dirty="0">
@@ -7362,67 +6539,6 @@
               <a:buFont typeface="Wingdings" panose="05000000000000000000" pitchFamily="2" charset="2"/>
               <a:buChar char="§"/>
             </a:pPr>
-            <a:endParaRPr lang="en-PH" sz="2400" dirty="0">
-              <a:solidFill>
-                <a:srgbClr val="000000"/>
-              </a:solidFill>
-              <a:latin typeface="+mn-lt"/>
-            </a:endParaRPr>
-          </a:p>
-          <a:p>
-            <a:pPr marL="342900" indent="-342900" algn="l">
-              <a:lnSpc>
-                <a:spcPct val="100000"/>
-              </a:lnSpc>
-              <a:buFont typeface="Wingdings" panose="05000000000000000000" pitchFamily="2" charset="2"/>
-              <a:buChar char="§"/>
-            </a:pPr>
-            <a:endParaRPr lang="en-PH" sz="2400" b="0" i="0" u="none" strike="noStrike" dirty="0">
-              <a:solidFill>
-                <a:srgbClr val="000000"/>
-              </a:solidFill>
-              <a:effectLst/>
-              <a:latin typeface="+mn-lt"/>
-            </a:endParaRPr>
-          </a:p>
-          <a:p>
-            <a:pPr marL="342900" indent="-342900" algn="l">
-              <a:lnSpc>
-                <a:spcPct val="100000"/>
-              </a:lnSpc>
-              <a:buFont typeface="Wingdings" panose="05000000000000000000" pitchFamily="2" charset="2"/>
-              <a:buChar char="§"/>
-            </a:pPr>
-            <a:endParaRPr lang="en-PH" sz="2400" dirty="0">
-              <a:solidFill>
-                <a:srgbClr val="000000"/>
-              </a:solidFill>
-              <a:latin typeface="+mn-lt"/>
-            </a:endParaRPr>
-          </a:p>
-          <a:p>
-            <a:pPr marL="342900" indent="-342900" algn="l">
-              <a:lnSpc>
-                <a:spcPct val="100000"/>
-              </a:lnSpc>
-              <a:buFont typeface="Wingdings" panose="05000000000000000000" pitchFamily="2" charset="2"/>
-              <a:buChar char="§"/>
-            </a:pPr>
-            <a:endParaRPr lang="en-PH" sz="2400" dirty="0">
-              <a:solidFill>
-                <a:srgbClr val="000000"/>
-              </a:solidFill>
-              <a:latin typeface="+mn-lt"/>
-            </a:endParaRPr>
-          </a:p>
-          <a:p>
-            <a:pPr marL="342900" indent="-342900" algn="l">
-              <a:lnSpc>
-                <a:spcPct val="100000"/>
-              </a:lnSpc>
-              <a:buFont typeface="Wingdings" panose="05000000000000000000" pitchFamily="2" charset="2"/>
-              <a:buChar char="§"/>
-            </a:pPr>
             <a:r>
               <a:rPr lang="en-PH" sz="2400" b="0" i="0" u="none" strike="noStrike" dirty="0">
                 <a:solidFill>
@@ -7431,7 +6547,7 @@
                 <a:effectLst/>
                 <a:latin typeface="+mn-lt"/>
               </a:rPr>
-              <a:t>It represents the presentation layer of application.</a:t>
+              <a:t>It translates the user's interactions with the view into actions that the model will perform. </a:t>
             </a:r>
           </a:p>
           <a:p>
@@ -7465,7 +6581,7 @@
                 <a:effectLst/>
                 <a:latin typeface="+mn-lt"/>
               </a:rPr>
-              <a:t>It is used to visualize the data that the model contains.</a:t>
+              <a:t>In a stand-alone GUI client, user interactions could be button clicks or menu selections.</a:t>
             </a:r>
           </a:p>
           <a:p>
@@ -7480,41 +6596,6 @@
               <a:solidFill>
                 <a:srgbClr val="000000"/>
               </a:solidFill>
-              <a:latin typeface="+mn-lt"/>
-            </a:endParaRPr>
-          </a:p>
-          <a:p>
-            <a:pPr marL="342900" indent="-342900" algn="l">
-              <a:lnSpc>
-                <a:spcPct val="100000"/>
-              </a:lnSpc>
-              <a:buFont typeface="Wingdings" panose="05000000000000000000" pitchFamily="2" charset="2"/>
-              <a:buChar char="§"/>
-            </a:pPr>
-            <a:r>
-              <a:rPr lang="en-PH" sz="2400" b="0" i="0" u="none" strike="noStrike" dirty="0">
-                <a:solidFill>
-                  <a:srgbClr val="000000"/>
-                </a:solidFill>
-                <a:effectLst/>
-                <a:latin typeface="+mn-lt"/>
-              </a:rPr>
-              <a:t>The view renders the contents of a model. It specifies exactly how the model data should be presented.</a:t>
-            </a:r>
-          </a:p>
-          <a:p>
-            <a:pPr marL="342900" indent="-342900" algn="l">
-              <a:lnSpc>
-                <a:spcPct val="100000"/>
-              </a:lnSpc>
-              <a:buFont typeface="Wingdings" panose="05000000000000000000" pitchFamily="2" charset="2"/>
-              <a:buChar char="§"/>
-            </a:pPr>
-            <a:endParaRPr lang="en-PH" sz="2400" b="0" i="0" u="none" strike="noStrike" dirty="0">
-              <a:solidFill>
-                <a:srgbClr val="000000"/>
-              </a:solidFill>
-              <a:effectLst/>
               <a:latin typeface="+mn-lt"/>
             </a:endParaRPr>
           </a:p>
@@ -7537,14 +6618,13 @@
               <a:t>In the context of JavaFX, this layer contains all </a:t>
             </a:r>
             <a:r>
-              <a:rPr lang="en-PH" sz="2400" b="1" i="0" u="none" strike="noStrike" dirty="0" err="1">
+              <a:rPr lang="en-PH" sz="2400" b="1" dirty="0">
                 <a:solidFill>
                   <a:srgbClr val="0070C0"/>
                 </a:solidFill>
-                <a:effectLst/>
                 <a:latin typeface="+mn-lt"/>
               </a:rPr>
-              <a:t>fxml</a:t>
+              <a:t>controller</a:t>
             </a:r>
             <a:r>
               <a:rPr lang="en-PH" sz="2400" b="1" i="0" u="none" strike="noStrike" dirty="0">
@@ -7589,12 +6669,10 @@
             </a:endParaRPr>
           </a:p>
           <a:p>
-            <a:pPr marL="342900" indent="-342900" algn="l">
+            <a:pPr algn="l">
               <a:lnSpc>
                 <a:spcPct val="100000"/>
               </a:lnSpc>
-              <a:buFont typeface="Wingdings" panose="05000000000000000000" pitchFamily="2" charset="2"/>
-              <a:buChar char="§"/>
             </a:pPr>
             <a:endParaRPr lang="en-PH" sz="2400" dirty="0">
               <a:solidFill>
@@ -7603,434 +6681,12 @@
               <a:latin typeface="+mn-lt"/>
             </a:endParaRPr>
           </a:p>
-          <a:p>
-            <a:pPr marL="342900" indent="-342900" algn="l">
-              <a:lnSpc>
-                <a:spcPct val="100000"/>
-              </a:lnSpc>
-              <a:buFont typeface="Wingdings" panose="05000000000000000000" pitchFamily="2" charset="2"/>
-              <a:buChar char="§"/>
-            </a:pPr>
-            <a:endParaRPr lang="en-PH" sz="2400" dirty="0">
-              <a:solidFill>
-                <a:srgbClr val="000000"/>
-              </a:solidFill>
-              <a:latin typeface="+mn-lt"/>
-            </a:endParaRPr>
-          </a:p>
-          <a:p>
-            <a:pPr marL="342900" indent="-342900" algn="l">
-              <a:lnSpc>
-                <a:spcPct val="100000"/>
-              </a:lnSpc>
-              <a:buFont typeface="Wingdings" panose="05000000000000000000" pitchFamily="2" charset="2"/>
-              <a:buChar char="§"/>
-            </a:pPr>
-            <a:endParaRPr lang="en-PH" sz="2400" dirty="0">
-              <a:solidFill>
-                <a:srgbClr val="000000"/>
-              </a:solidFill>
-              <a:latin typeface="+mn-lt"/>
-            </a:endParaRPr>
-          </a:p>
-          <a:p>
-            <a:pPr marL="342900" indent="-342900" algn="l">
-              <a:lnSpc>
-                <a:spcPct val="100000"/>
-              </a:lnSpc>
-              <a:buFont typeface="Wingdings" panose="05000000000000000000" pitchFamily="2" charset="2"/>
-              <a:buChar char="§"/>
-            </a:pPr>
-            <a:endParaRPr lang="en-PH" sz="2400" dirty="0">
-              <a:solidFill>
-                <a:srgbClr val="000000"/>
-              </a:solidFill>
-              <a:latin typeface="+mn-lt"/>
-            </a:endParaRPr>
-          </a:p>
-          <a:p>
-            <a:pPr marL="342900" indent="-342900" algn="l">
-              <a:lnSpc>
-                <a:spcPct val="100000"/>
-              </a:lnSpc>
-              <a:buFont typeface="Wingdings" panose="05000000000000000000" pitchFamily="2" charset="2"/>
-              <a:buChar char="§"/>
-            </a:pPr>
-            <a:endParaRPr lang="en-PH" sz="2400" dirty="0">
-              <a:solidFill>
-                <a:srgbClr val="000000"/>
-              </a:solidFill>
-              <a:latin typeface="+mn-lt"/>
-            </a:endParaRPr>
-          </a:p>
         </p:txBody>
       </p:sp>
     </p:spTree>
     <p:extLst>
       <p:ext uri="{BB962C8B-B14F-4D97-AF65-F5344CB8AC3E}">
-        <p14:creationId xmlns:p14="http://schemas.microsoft.com/office/powerpoint/2010/main" val="3587619782"/>
-      </p:ext>
-    </p:extLst>
-  </p:cSld>
-  <p:clrMapOvr>
-    <a:masterClrMapping/>
-  </p:clrMapOvr>
-</p:sld>
-</file>
-
-<file path=ppt/slides/slide9.xml><?xml version="1.0" encoding="utf-8"?>
-<p:sld xmlns:a="http://schemas.openxmlformats.org/drawingml/2006/main" xmlns:r="http://schemas.openxmlformats.org/officeDocument/2006/relationships" xmlns:p="http://schemas.openxmlformats.org/presentationml/2006/main">
-  <p:cSld>
-    <p:bg>
-      <p:bgPr>
-        <a:blipFill dpi="0" rotWithShape="1">
-          <a:blip r:embed="rId3">
-            <a:alphaModFix amt="99000"/>
-            <a:lum/>
-          </a:blip>
-          <a:srcRect/>
-          <a:stretch>
-            <a:fillRect t="89000" r="85000" b="-1000"/>
-          </a:stretch>
-        </a:blipFill>
-        <a:effectLst/>
-      </p:bgPr>
-    </p:bg>
-    <p:spTree>
-      <p:nvGrpSpPr>
-        <p:cNvPr id="1" name=""/>
-        <p:cNvGrpSpPr/>
-        <p:nvPr/>
-      </p:nvGrpSpPr>
-      <p:grpSpPr>
-        <a:xfrm>
-          <a:off x="0" y="0"/>
-          <a:ext cx="0" cy="0"/>
-          <a:chOff x="0" y="0"/>
-          <a:chExt cx="0" cy="0"/>
-        </a:xfrm>
-      </p:grpSpPr>
-      <p:sp>
-        <p:nvSpPr>
-          <p:cNvPr id="2" name="Title 1">
-            <a:extLst>
-              <a:ext uri="{FF2B5EF4-FFF2-40B4-BE49-F238E27FC236}">
-                <a16:creationId xmlns:a16="http://schemas.microsoft.com/office/drawing/2014/main" id="{6A3DCE86-C2BA-4713-9E7A-73589E8D6CCF}"/>
-              </a:ext>
-            </a:extLst>
-          </p:cNvPr>
-          <p:cNvSpPr>
-            <a:spLocks noGrp="1"/>
-          </p:cNvSpPr>
-          <p:nvPr>
-            <p:ph type="ctrTitle"/>
-          </p:nvPr>
-        </p:nvSpPr>
-        <p:spPr>
-          <a:xfrm>
-            <a:off x="1524000" y="497150"/>
-            <a:ext cx="9144000" cy="718459"/>
-          </a:xfrm>
-        </p:spPr>
-        <p:txBody>
-          <a:bodyPr>
-            <a:noAutofit/>
-          </a:bodyPr>
-          <a:lstStyle/>
-          <a:p>
-            <a:r>
-              <a:rPr lang="en-PH" sz="5400" b="1"/>
-              <a:t>Outline</a:t>
-            </a:r>
-            <a:endParaRPr lang="en-PH" sz="5000" b="1" dirty="0"/>
-          </a:p>
-        </p:txBody>
-      </p:sp>
-      <p:sp>
-        <p:nvSpPr>
-          <p:cNvPr id="4" name="Footer Placeholder 3">
-            <a:extLst>
-              <a:ext uri="{FF2B5EF4-FFF2-40B4-BE49-F238E27FC236}">
-                <a16:creationId xmlns:a16="http://schemas.microsoft.com/office/drawing/2014/main" id="{638E7DE1-45EE-476A-A474-0F3C264AEDA3}"/>
-              </a:ext>
-            </a:extLst>
-          </p:cNvPr>
-          <p:cNvSpPr>
-            <a:spLocks noGrp="1"/>
-          </p:cNvSpPr>
-          <p:nvPr>
-            <p:ph type="ftr" sz="quarter" idx="11"/>
-          </p:nvPr>
-        </p:nvSpPr>
-        <p:spPr>
-          <a:xfrm>
-            <a:off x="0" y="6139541"/>
-            <a:ext cx="12192000" cy="718459"/>
-          </a:xfrm>
-          <a:ln w="28575">
-            <a:solidFill>
-              <a:schemeClr val="accent5">
-                <a:lumMod val="50000"/>
-              </a:schemeClr>
-            </a:solidFill>
-          </a:ln>
-        </p:spPr>
-        <p:txBody>
-          <a:bodyPr/>
-          <a:lstStyle/>
-          <a:p>
-            <a:pPr algn="r"/>
-            <a:r>
-              <a:rPr lang="en-PH" b="1">
-                <a:solidFill>
-                  <a:schemeClr val="tx1"/>
-                </a:solidFill>
-              </a:rPr>
-              <a:t>CCOBJPGL</a:t>
-            </a:r>
-            <a:endParaRPr lang="en-PH" dirty="0"/>
-          </a:p>
-        </p:txBody>
-      </p:sp>
-      <p:sp>
-        <p:nvSpPr>
-          <p:cNvPr id="5" name="Title 1">
-            <a:extLst>
-              <a:ext uri="{FF2B5EF4-FFF2-40B4-BE49-F238E27FC236}">
-                <a16:creationId xmlns:a16="http://schemas.microsoft.com/office/drawing/2014/main" id="{3444037F-B658-D82C-5DCA-53E8AA1493D7}"/>
-              </a:ext>
-            </a:extLst>
-          </p:cNvPr>
-          <p:cNvSpPr txBox="1">
-            <a:spLocks/>
-          </p:cNvSpPr>
-          <p:nvPr/>
-        </p:nvSpPr>
-        <p:spPr>
-          <a:xfrm>
-            <a:off x="1524000" y="1516449"/>
-            <a:ext cx="9144000" cy="4290585"/>
-          </a:xfrm>
-          <a:prstGeom prst="rect">
-            <a:avLst/>
-          </a:prstGeom>
-        </p:spPr>
-        <p:txBody>
-          <a:bodyPr vert="horz" lIns="91440" tIns="45720" rIns="91440" bIns="45720" rtlCol="0" anchor="b">
-            <a:normAutofit fontScale="97500"/>
-          </a:bodyPr>
-          <a:lstStyle>
-            <a:lvl1pPr algn="ctr" defTabSz="914400" rtl="0" eaLnBrk="1" latinLnBrk="0" hangingPunct="1">
-              <a:lnSpc>
-                <a:spcPct val="90000"/>
-              </a:lnSpc>
-              <a:spcBef>
-                <a:spcPct val="0"/>
-              </a:spcBef>
-              <a:buNone/>
-              <a:defRPr sz="6000" kern="1200">
-                <a:solidFill>
-                  <a:schemeClr val="tx1"/>
-                </a:solidFill>
-                <a:latin typeface="+mj-lt"/>
-                <a:ea typeface="+mj-ea"/>
-                <a:cs typeface="+mj-cs"/>
-              </a:defRPr>
-            </a:lvl1pPr>
-          </a:lstStyle>
-          <a:p>
-            <a:pPr marL="342900" indent="-342900" algn="l">
-              <a:lnSpc>
-                <a:spcPct val="100000"/>
-              </a:lnSpc>
-              <a:buFont typeface="Wingdings" panose="05000000000000000000" pitchFamily="2" charset="2"/>
-              <a:buChar char="Ø"/>
-            </a:pPr>
-            <a:r>
-              <a:rPr lang="en-US" sz="2500" dirty="0">
-                <a:solidFill>
-                  <a:schemeClr val="bg2">
-                    <a:lumMod val="75000"/>
-                  </a:schemeClr>
-                </a:solidFill>
-                <a:latin typeface="Calibri (Body)"/>
-              </a:rPr>
-              <a:t>Introduction</a:t>
-            </a:r>
-          </a:p>
-          <a:p>
-            <a:pPr marL="342900" indent="-342900" algn="l">
-              <a:lnSpc>
-                <a:spcPct val="100000"/>
-              </a:lnSpc>
-              <a:buFont typeface="Wingdings" panose="05000000000000000000" pitchFamily="2" charset="2"/>
-              <a:buChar char="Ø"/>
-            </a:pPr>
-            <a:endParaRPr lang="en-US" sz="2500" dirty="0">
-              <a:latin typeface="Calibri (Body)"/>
-            </a:endParaRPr>
-          </a:p>
-          <a:p>
-            <a:pPr marL="342900" indent="-342900" algn="l">
-              <a:lnSpc>
-                <a:spcPct val="100000"/>
-              </a:lnSpc>
-              <a:buFont typeface="Wingdings" panose="05000000000000000000" pitchFamily="2" charset="2"/>
-              <a:buChar char="Ø"/>
-            </a:pPr>
-            <a:r>
-              <a:rPr lang="en-US" sz="2500" dirty="0">
-                <a:solidFill>
-                  <a:schemeClr val="bg2">
-                    <a:lumMod val="75000"/>
-                  </a:schemeClr>
-                </a:solidFill>
-                <a:latin typeface="Calibri (Body)"/>
-              </a:rPr>
-              <a:t>Model</a:t>
-            </a:r>
-            <a:endParaRPr lang="en-US" sz="2500" b="1" dirty="0">
-              <a:solidFill>
-                <a:schemeClr val="bg2">
-                  <a:lumMod val="75000"/>
-                </a:schemeClr>
-              </a:solidFill>
-              <a:latin typeface="Calibri (Body)"/>
-            </a:endParaRPr>
-          </a:p>
-          <a:p>
-            <a:pPr marL="342900" indent="-342900" algn="l">
-              <a:lnSpc>
-                <a:spcPct val="100000"/>
-              </a:lnSpc>
-              <a:buFont typeface="Wingdings" panose="05000000000000000000" pitchFamily="2" charset="2"/>
-              <a:buChar char="Ø"/>
-            </a:pPr>
-            <a:endParaRPr lang="en-US" sz="2500" b="1" dirty="0">
-              <a:solidFill>
-                <a:schemeClr val="bg2">
-                  <a:lumMod val="75000"/>
-                </a:schemeClr>
-              </a:solidFill>
-              <a:latin typeface="Calibri (Body)"/>
-            </a:endParaRPr>
-          </a:p>
-          <a:p>
-            <a:pPr marL="342900" indent="-342900" algn="l">
-              <a:lnSpc>
-                <a:spcPct val="100000"/>
-              </a:lnSpc>
-              <a:buFont typeface="Wingdings" panose="05000000000000000000" pitchFamily="2" charset="2"/>
-              <a:buChar char="Ø"/>
-            </a:pPr>
-            <a:r>
-              <a:rPr lang="en-US" sz="2500" dirty="0">
-                <a:solidFill>
-                  <a:schemeClr val="bg2">
-                    <a:lumMod val="75000"/>
-                  </a:schemeClr>
-                </a:solidFill>
-                <a:latin typeface="Calibri (Body)"/>
-              </a:rPr>
-              <a:t>View </a:t>
-            </a:r>
-          </a:p>
-          <a:p>
-            <a:pPr marL="342900" indent="-342900" algn="l">
-              <a:lnSpc>
-                <a:spcPct val="100000"/>
-              </a:lnSpc>
-              <a:buFont typeface="Wingdings" panose="05000000000000000000" pitchFamily="2" charset="2"/>
-              <a:buChar char="Ø"/>
-            </a:pPr>
-            <a:endParaRPr lang="en-US" sz="2500" dirty="0">
-              <a:solidFill>
-                <a:schemeClr val="bg2">
-                  <a:lumMod val="75000"/>
-                </a:schemeClr>
-              </a:solidFill>
-              <a:latin typeface="Calibri (Body)"/>
-            </a:endParaRPr>
-          </a:p>
-          <a:p>
-            <a:pPr marL="342900" indent="-342900" algn="l">
-              <a:lnSpc>
-                <a:spcPct val="100000"/>
-              </a:lnSpc>
-              <a:buFont typeface="Wingdings" panose="05000000000000000000" pitchFamily="2" charset="2"/>
-              <a:buChar char="Ø"/>
-            </a:pPr>
-            <a:r>
-              <a:rPr lang="en-US" sz="2500" b="1" dirty="0">
-                <a:latin typeface="Calibri (Body)"/>
-              </a:rPr>
-              <a:t>Controller</a:t>
-            </a:r>
-          </a:p>
-          <a:p>
-            <a:pPr algn="l">
-              <a:lnSpc>
-                <a:spcPct val="100000"/>
-              </a:lnSpc>
-            </a:pPr>
-            <a:endParaRPr lang="en-US" sz="2500" b="1" dirty="0">
-              <a:latin typeface="Calibri (Body)"/>
-            </a:endParaRPr>
-          </a:p>
-          <a:p>
-            <a:pPr marL="342900" indent="-342900" algn="l">
-              <a:lnSpc>
-                <a:spcPct val="100000"/>
-              </a:lnSpc>
-              <a:buFont typeface="Wingdings" panose="05000000000000000000" pitchFamily="2" charset="2"/>
-              <a:buChar char="Ø"/>
-            </a:pPr>
-            <a:endParaRPr lang="en-US" sz="2500" dirty="0">
-              <a:latin typeface="Calibri (Body)"/>
-            </a:endParaRPr>
-          </a:p>
-          <a:p>
-            <a:pPr marL="342900" indent="-342900" algn="l">
-              <a:lnSpc>
-                <a:spcPct val="100000"/>
-              </a:lnSpc>
-              <a:buFont typeface="Wingdings" panose="05000000000000000000" pitchFamily="2" charset="2"/>
-              <a:buChar char="Ø"/>
-            </a:pPr>
-            <a:endParaRPr lang="en-US" sz="2500" dirty="0">
-              <a:latin typeface="Calibri (Body)"/>
-            </a:endParaRPr>
-          </a:p>
-          <a:p>
-            <a:pPr marL="342900" indent="-342900" algn="l">
-              <a:lnSpc>
-                <a:spcPct val="100000"/>
-              </a:lnSpc>
-              <a:buFont typeface="Wingdings" panose="05000000000000000000" pitchFamily="2" charset="2"/>
-              <a:buChar char="Ø"/>
-            </a:pPr>
-            <a:endParaRPr lang="en-US" sz="2500" dirty="0">
-              <a:latin typeface="Calibri (Body)"/>
-            </a:endParaRPr>
-          </a:p>
-          <a:p>
-            <a:pPr marL="342900" indent="-342900" algn="l">
-              <a:lnSpc>
-                <a:spcPct val="100000"/>
-              </a:lnSpc>
-              <a:buFont typeface="Wingdings" panose="05000000000000000000" pitchFamily="2" charset="2"/>
-              <a:buChar char="Ø"/>
-            </a:pPr>
-            <a:endParaRPr lang="en-US" sz="2500" dirty="0">
-              <a:latin typeface="Calibri (Body)"/>
-            </a:endParaRPr>
-          </a:p>
-        </p:txBody>
-      </p:sp>
-    </p:spTree>
-    <p:extLst>
-      <p:ext uri="{BB962C8B-B14F-4D97-AF65-F5344CB8AC3E}">
-        <p14:creationId xmlns:p14="http://schemas.microsoft.com/office/powerpoint/2010/main" val="999446379"/>
+        <p14:creationId xmlns:p14="http://schemas.microsoft.com/office/powerpoint/2010/main" val="638456497"/>
       </p:ext>
     </p:extLst>
   </p:cSld>

</xml_diff>